<commit_message>
Uploading slides that contain the performance difference of CAM vs regular hash code
</commit_message>
<xml_diff>
--- a/Faysal/Weekly_Meeting_210211.pptx
+++ b/Faysal/Weekly_Meeting_210211.pptx
@@ -433,6 +433,451 @@
     </pc:docChg>
   </pc:docChgLst>
   <pc:docChgLst>
+    <pc:chgData name="Md Kauser Ahmmed" userId="81e39d19-8d5c-4ffe-9a82-20799efac8e0" providerId="ADAL" clId="{493F2EBC-02EC-4170-8502-33D60480A14B}"/>
+    <pc:docChg chg="undo custSel mod addSld delSld modSld sldOrd">
+      <pc:chgData name="Md Kauser Ahmmed" userId="81e39d19-8d5c-4ffe-9a82-20799efac8e0" providerId="ADAL" clId="{493F2EBC-02EC-4170-8502-33D60480A14B}" dt="2021-01-22T17:44:34.640" v="1995" actId="20577"/>
+      <pc:docMkLst>
+        <pc:docMk/>
+      </pc:docMkLst>
+      <pc:sldChg chg="modSp add">
+        <pc:chgData name="Md Kauser Ahmmed" userId="81e39d19-8d5c-4ffe-9a82-20799efac8e0" providerId="ADAL" clId="{493F2EBC-02EC-4170-8502-33D60480A14B}" dt="2021-01-15T15:57:41.678" v="43" actId="20577"/>
+        <pc:sldMkLst>
+          <pc:docMk/>
+          <pc:sldMk cId="2006097519" sldId="256"/>
+        </pc:sldMkLst>
+        <pc:spChg chg="mod">
+          <ac:chgData name="Md Kauser Ahmmed" userId="81e39d19-8d5c-4ffe-9a82-20799efac8e0" providerId="ADAL" clId="{493F2EBC-02EC-4170-8502-33D60480A14B}" dt="2021-01-15T15:57:32.674" v="18" actId="20577"/>
+          <ac:spMkLst>
+            <pc:docMk/>
+            <pc:sldMk cId="2006097519" sldId="256"/>
+            <ac:spMk id="2" creationId="{AEBDAA72-FF48-42CF-A6B6-C1C80010963F}"/>
+          </ac:spMkLst>
+        </pc:spChg>
+        <pc:spChg chg="mod">
+          <ac:chgData name="Md Kauser Ahmmed" userId="81e39d19-8d5c-4ffe-9a82-20799efac8e0" providerId="ADAL" clId="{493F2EBC-02EC-4170-8502-33D60480A14B}" dt="2021-01-15T15:57:41.678" v="43" actId="20577"/>
+          <ac:spMkLst>
+            <pc:docMk/>
+            <pc:sldMk cId="2006097519" sldId="256"/>
+            <ac:spMk id="3" creationId="{4A796019-1174-416E-99B9-9CF117EE3B6F}"/>
+          </ac:spMkLst>
+        </pc:spChg>
+      </pc:sldChg>
+      <pc:sldChg chg="add del">
+        <pc:chgData name="Md Kauser Ahmmed" userId="81e39d19-8d5c-4ffe-9a82-20799efac8e0" providerId="ADAL" clId="{493F2EBC-02EC-4170-8502-33D60480A14B}" dt="2021-01-15T15:58:38.857" v="46" actId="2696"/>
+        <pc:sldMkLst>
+          <pc:docMk/>
+          <pc:sldMk cId="2240536683" sldId="257"/>
+        </pc:sldMkLst>
+      </pc:sldChg>
+      <pc:sldChg chg="modSp add">
+        <pc:chgData name="Md Kauser Ahmmed" userId="81e39d19-8d5c-4ffe-9a82-20799efac8e0" providerId="ADAL" clId="{493F2EBC-02EC-4170-8502-33D60480A14B}" dt="2021-01-15T17:27:50.937" v="1193" actId="20577"/>
+        <pc:sldMkLst>
+          <pc:docMk/>
+          <pc:sldMk cId="1493241202" sldId="289"/>
+        </pc:sldMkLst>
+        <pc:spChg chg="mod">
+          <ac:chgData name="Md Kauser Ahmmed" userId="81e39d19-8d5c-4ffe-9a82-20799efac8e0" providerId="ADAL" clId="{493F2EBC-02EC-4170-8502-33D60480A14B}" dt="2021-01-15T17:27:50.937" v="1193" actId="20577"/>
+          <ac:spMkLst>
+            <pc:docMk/>
+            <pc:sldMk cId="1493241202" sldId="289"/>
+            <ac:spMk id="2" creationId="{2A32364B-E594-4014-AB37-6A6F82375CD6}"/>
+          </ac:spMkLst>
+        </pc:spChg>
+        <pc:spChg chg="mod">
+          <ac:chgData name="Md Kauser Ahmmed" userId="81e39d19-8d5c-4ffe-9a82-20799efac8e0" providerId="ADAL" clId="{493F2EBC-02EC-4170-8502-33D60480A14B}" dt="2021-01-15T16:50:50.708" v="1077" actId="20577"/>
+          <ac:spMkLst>
+            <pc:docMk/>
+            <pc:sldMk cId="1493241202" sldId="289"/>
+            <ac:spMk id="3" creationId="{FAF7EFD8-937E-4485-A5BE-D7EBC0477783}"/>
+          </ac:spMkLst>
+        </pc:spChg>
+      </pc:sldChg>
+      <pc:sldChg chg="addSp delSp modSp add modNotesTx">
+        <pc:chgData name="Md Kauser Ahmmed" userId="81e39d19-8d5c-4ffe-9a82-20799efac8e0" providerId="ADAL" clId="{493F2EBC-02EC-4170-8502-33D60480A14B}" dt="2021-01-15T18:03:53.309" v="1606" actId="20577"/>
+        <pc:sldMkLst>
+          <pc:docMk/>
+          <pc:sldMk cId="3625187802" sldId="290"/>
+        </pc:sldMkLst>
+        <pc:spChg chg="mod">
+          <ac:chgData name="Md Kauser Ahmmed" userId="81e39d19-8d5c-4ffe-9a82-20799efac8e0" providerId="ADAL" clId="{493F2EBC-02EC-4170-8502-33D60480A14B}" dt="2021-01-15T18:03:53.309" v="1606" actId="20577"/>
+          <ac:spMkLst>
+            <pc:docMk/>
+            <pc:sldMk cId="3625187802" sldId="290"/>
+            <ac:spMk id="3" creationId="{64F80B61-502D-47EC-86FD-28DA3D65A610}"/>
+          </ac:spMkLst>
+        </pc:spChg>
+        <pc:spChg chg="mod">
+          <ac:chgData name="Md Kauser Ahmmed" userId="81e39d19-8d5c-4ffe-9a82-20799efac8e0" providerId="ADAL" clId="{493F2EBC-02EC-4170-8502-33D60480A14B}" dt="2021-01-15T16:15:03.228" v="491" actId="20577"/>
+          <ac:spMkLst>
+            <pc:docMk/>
+            <pc:sldMk cId="3625187802" sldId="290"/>
+            <ac:spMk id="4" creationId="{6AEC439A-3C5B-4863-9155-034116FD58FC}"/>
+          </ac:spMkLst>
+        </pc:spChg>
+        <pc:spChg chg="add del">
+          <ac:chgData name="Md Kauser Ahmmed" userId="81e39d19-8d5c-4ffe-9a82-20799efac8e0" providerId="ADAL" clId="{493F2EBC-02EC-4170-8502-33D60480A14B}" dt="2021-01-15T16:15:14.755" v="494"/>
+          <ac:spMkLst>
+            <pc:docMk/>
+            <pc:sldMk cId="3625187802" sldId="290"/>
+            <ac:spMk id="5" creationId="{BCA39098-39BA-4641-B602-64D0522B7EEF}"/>
+          </ac:spMkLst>
+        </pc:spChg>
+      </pc:sldChg>
+      <pc:sldChg chg="add del">
+        <pc:chgData name="Md Kauser Ahmmed" userId="81e39d19-8d5c-4ffe-9a82-20799efac8e0" providerId="ADAL" clId="{493F2EBC-02EC-4170-8502-33D60480A14B}" dt="2021-01-15T16:15:11.393" v="492" actId="2696"/>
+        <pc:sldMkLst>
+          <pc:docMk/>
+          <pc:sldMk cId="3212494215" sldId="291"/>
+        </pc:sldMkLst>
+      </pc:sldChg>
+      <pc:sldChg chg="addSp delSp modSp add">
+        <pc:chgData name="Md Kauser Ahmmed" userId="81e39d19-8d5c-4ffe-9a82-20799efac8e0" providerId="ADAL" clId="{493F2EBC-02EC-4170-8502-33D60480A14B}" dt="2021-01-15T18:03:50.957" v="1605" actId="20577"/>
+        <pc:sldMkLst>
+          <pc:docMk/>
+          <pc:sldMk cId="4160295388" sldId="291"/>
+        </pc:sldMkLst>
+        <pc:spChg chg="del mod">
+          <ac:chgData name="Md Kauser Ahmmed" userId="81e39d19-8d5c-4ffe-9a82-20799efac8e0" providerId="ADAL" clId="{493F2EBC-02EC-4170-8502-33D60480A14B}" dt="2021-01-15T16:48:50.534" v="1040" actId="478"/>
+          <ac:spMkLst>
+            <pc:docMk/>
+            <pc:sldMk cId="4160295388" sldId="291"/>
+            <ac:spMk id="3" creationId="{64F80B61-502D-47EC-86FD-28DA3D65A610}"/>
+          </ac:spMkLst>
+        </pc:spChg>
+        <pc:spChg chg="mod">
+          <ac:chgData name="Md Kauser Ahmmed" userId="81e39d19-8d5c-4ffe-9a82-20799efac8e0" providerId="ADAL" clId="{493F2EBC-02EC-4170-8502-33D60480A14B}" dt="2021-01-15T16:15:27.042" v="503" actId="20577"/>
+          <ac:spMkLst>
+            <pc:docMk/>
+            <pc:sldMk cId="4160295388" sldId="291"/>
+            <ac:spMk id="4" creationId="{6AEC439A-3C5B-4863-9155-034116FD58FC}"/>
+          </ac:spMkLst>
+        </pc:spChg>
+        <pc:spChg chg="add del mod">
+          <ac:chgData name="Md Kauser Ahmmed" userId="81e39d19-8d5c-4ffe-9a82-20799efac8e0" providerId="ADAL" clId="{493F2EBC-02EC-4170-8502-33D60480A14B}" dt="2021-01-15T16:48:53.673" v="1041" actId="478"/>
+          <ac:spMkLst>
+            <pc:docMk/>
+            <pc:sldMk cId="4160295388" sldId="291"/>
+            <ac:spMk id="5" creationId="{372D9376-7D96-436B-9E41-57950CE9D72D}"/>
+          </ac:spMkLst>
+        </pc:spChg>
+        <pc:spChg chg="add mod">
+          <ac:chgData name="Md Kauser Ahmmed" userId="81e39d19-8d5c-4ffe-9a82-20799efac8e0" providerId="ADAL" clId="{493F2EBC-02EC-4170-8502-33D60480A14B}" dt="2021-01-15T18:03:50.957" v="1605" actId="20577"/>
+          <ac:spMkLst>
+            <pc:docMk/>
+            <pc:sldMk cId="4160295388" sldId="291"/>
+            <ac:spMk id="6" creationId="{B9F24D49-A6BF-42DD-AB82-41C553DBB037}"/>
+          </ac:spMkLst>
+        </pc:spChg>
+      </pc:sldChg>
+      <pc:sldChg chg="modSp add ord">
+        <pc:chgData name="Md Kauser Ahmmed" userId="81e39d19-8d5c-4ffe-9a82-20799efac8e0" providerId="ADAL" clId="{493F2EBC-02EC-4170-8502-33D60480A14B}" dt="2021-01-15T17:40:33.307" v="1194"/>
+        <pc:sldMkLst>
+          <pc:docMk/>
+          <pc:sldMk cId="1686372199" sldId="292"/>
+        </pc:sldMkLst>
+        <pc:spChg chg="mod">
+          <ac:chgData name="Md Kauser Ahmmed" userId="81e39d19-8d5c-4ffe-9a82-20799efac8e0" providerId="ADAL" clId="{493F2EBC-02EC-4170-8502-33D60480A14B}" dt="2021-01-15T17:08:38.606" v="1162" actId="20577"/>
+          <ac:spMkLst>
+            <pc:docMk/>
+            <pc:sldMk cId="1686372199" sldId="292"/>
+            <ac:spMk id="2" creationId="{F569C05B-F406-4613-8012-1E0E756BA18C}"/>
+          </ac:spMkLst>
+        </pc:spChg>
+        <pc:spChg chg="mod">
+          <ac:chgData name="Md Kauser Ahmmed" userId="81e39d19-8d5c-4ffe-9a82-20799efac8e0" providerId="ADAL" clId="{493F2EBC-02EC-4170-8502-33D60480A14B}" dt="2021-01-15T16:38:33.002" v="828" actId="20577"/>
+          <ac:spMkLst>
+            <pc:docMk/>
+            <pc:sldMk cId="1686372199" sldId="292"/>
+            <ac:spMk id="3" creationId="{1ADF2921-7174-49C4-8F93-68E27B432AE2}"/>
+          </ac:spMkLst>
+        </pc:spChg>
+      </pc:sldChg>
+      <pc:sldChg chg="addSp delSp modSp add ord">
+        <pc:chgData name="Md Kauser Ahmmed" userId="81e39d19-8d5c-4ffe-9a82-20799efac8e0" providerId="ADAL" clId="{493F2EBC-02EC-4170-8502-33D60480A14B}" dt="2021-01-15T17:40:33.307" v="1194"/>
+        <pc:sldMkLst>
+          <pc:docMk/>
+          <pc:sldMk cId="675136312" sldId="293"/>
+        </pc:sldMkLst>
+        <pc:spChg chg="mod">
+          <ac:chgData name="Md Kauser Ahmmed" userId="81e39d19-8d5c-4ffe-9a82-20799efac8e0" providerId="ADAL" clId="{493F2EBC-02EC-4170-8502-33D60480A14B}" dt="2021-01-15T16:39:20.775" v="878" actId="20577"/>
+          <ac:spMkLst>
+            <pc:docMk/>
+            <pc:sldMk cId="675136312" sldId="293"/>
+            <ac:spMk id="2" creationId="{738B26C2-4373-446B-8029-46FFEC6F3E56}"/>
+          </ac:spMkLst>
+        </pc:spChg>
+        <pc:spChg chg="del">
+          <ac:chgData name="Md Kauser Ahmmed" userId="81e39d19-8d5c-4ffe-9a82-20799efac8e0" providerId="ADAL" clId="{493F2EBC-02EC-4170-8502-33D60480A14B}" dt="2021-01-15T16:40:29.565" v="879" actId="478"/>
+          <ac:spMkLst>
+            <pc:docMk/>
+            <pc:sldMk cId="675136312" sldId="293"/>
+            <ac:spMk id="3" creationId="{406E90FC-D54E-4FF3-AE42-805EC0AE34DF}"/>
+          </ac:spMkLst>
+        </pc:spChg>
+        <pc:spChg chg="add mod">
+          <ac:chgData name="Md Kauser Ahmmed" userId="81e39d19-8d5c-4ffe-9a82-20799efac8e0" providerId="ADAL" clId="{493F2EBC-02EC-4170-8502-33D60480A14B}" dt="2021-01-15T16:44:51.304" v="968" actId="20577"/>
+          <ac:spMkLst>
+            <pc:docMk/>
+            <pc:sldMk cId="675136312" sldId="293"/>
+            <ac:spMk id="4" creationId="{36126143-832A-4E8D-B6DE-213C571768D7}"/>
+          </ac:spMkLst>
+        </pc:spChg>
+      </pc:sldChg>
+      <pc:sldChg chg="addSp delSp modSp add mod setBg modNotesTx">
+        <pc:chgData name="Md Kauser Ahmmed" userId="81e39d19-8d5c-4ffe-9a82-20799efac8e0" providerId="ADAL" clId="{493F2EBC-02EC-4170-8502-33D60480A14B}" dt="2021-01-15T18:19:08.461" v="1818" actId="20577"/>
+        <pc:sldMkLst>
+          <pc:docMk/>
+          <pc:sldMk cId="2706077540" sldId="294"/>
+        </pc:sldMkLst>
+        <pc:spChg chg="mod">
+          <ac:chgData name="Md Kauser Ahmmed" userId="81e39d19-8d5c-4ffe-9a82-20799efac8e0" providerId="ADAL" clId="{493F2EBC-02EC-4170-8502-33D60480A14B}" dt="2021-01-15T17:27:26.883" v="1187" actId="26606"/>
+          <ac:spMkLst>
+            <pc:docMk/>
+            <pc:sldMk cId="2706077540" sldId="294"/>
+            <ac:spMk id="2" creationId="{67336AB1-F8D3-4CB3-A161-02F750F9D74B}"/>
+          </ac:spMkLst>
+        </pc:spChg>
+        <pc:spChg chg="del">
+          <ac:chgData name="Md Kauser Ahmmed" userId="81e39d19-8d5c-4ffe-9a82-20799efac8e0" providerId="ADAL" clId="{493F2EBC-02EC-4170-8502-33D60480A14B}" dt="2021-01-15T17:27:00.574" v="1179" actId="478"/>
+          <ac:spMkLst>
+            <pc:docMk/>
+            <pc:sldMk cId="2706077540" sldId="294"/>
+            <ac:spMk id="3" creationId="{1E8A3D68-0327-4534-960A-88BFA00FA542}"/>
+          </ac:spMkLst>
+        </pc:spChg>
+        <pc:spChg chg="add">
+          <ac:chgData name="Md Kauser Ahmmed" userId="81e39d19-8d5c-4ffe-9a82-20799efac8e0" providerId="ADAL" clId="{493F2EBC-02EC-4170-8502-33D60480A14B}" dt="2021-01-15T17:27:26.883" v="1187" actId="26606"/>
+          <ac:spMkLst>
+            <pc:docMk/>
+            <pc:sldMk cId="2706077540" sldId="294"/>
+            <ac:spMk id="10" creationId="{53F29798-D584-4792-9B62-3F5F5C36D619}"/>
+          </ac:spMkLst>
+        </pc:spChg>
+        <pc:picChg chg="add mod">
+          <ac:chgData name="Md Kauser Ahmmed" userId="81e39d19-8d5c-4ffe-9a82-20799efac8e0" providerId="ADAL" clId="{493F2EBC-02EC-4170-8502-33D60480A14B}" dt="2021-01-15T17:27:26.883" v="1187" actId="26606"/>
+          <ac:picMkLst>
+            <pc:docMk/>
+            <pc:sldMk cId="2706077540" sldId="294"/>
+            <ac:picMk id="5" creationId="{4B0A2808-FBDE-4B81-ABD0-DF969D466F48}"/>
+          </ac:picMkLst>
+        </pc:picChg>
+      </pc:sldChg>
+      <pc:sldChg chg="modSp add">
+        <pc:chgData name="Md Kauser Ahmmed" userId="81e39d19-8d5c-4ffe-9a82-20799efac8e0" providerId="ADAL" clId="{493F2EBC-02EC-4170-8502-33D60480A14B}" dt="2021-01-15T17:50:54.303" v="1356" actId="20577"/>
+        <pc:sldMkLst>
+          <pc:docMk/>
+          <pc:sldMk cId="4181624959" sldId="295"/>
+        </pc:sldMkLst>
+        <pc:spChg chg="mod">
+          <ac:chgData name="Md Kauser Ahmmed" userId="81e39d19-8d5c-4ffe-9a82-20799efac8e0" providerId="ADAL" clId="{493F2EBC-02EC-4170-8502-33D60480A14B}" dt="2021-01-15T17:50:54.303" v="1356" actId="20577"/>
+          <ac:spMkLst>
+            <pc:docMk/>
+            <pc:sldMk cId="4181624959" sldId="295"/>
+            <ac:spMk id="3" creationId="{1ADF2921-7174-49C4-8F93-68E27B432AE2}"/>
+          </ac:spMkLst>
+        </pc:spChg>
+      </pc:sldChg>
+      <pc:sldChg chg="modSp add">
+        <pc:chgData name="Md Kauser Ahmmed" userId="81e39d19-8d5c-4ffe-9a82-20799efac8e0" providerId="ADAL" clId="{493F2EBC-02EC-4170-8502-33D60480A14B}" dt="2021-01-15T17:55:19.197" v="1454" actId="20577"/>
+        <pc:sldMkLst>
+          <pc:docMk/>
+          <pc:sldMk cId="2092622795" sldId="296"/>
+        </pc:sldMkLst>
+        <pc:spChg chg="mod">
+          <ac:chgData name="Md Kauser Ahmmed" userId="81e39d19-8d5c-4ffe-9a82-20799efac8e0" providerId="ADAL" clId="{493F2EBC-02EC-4170-8502-33D60480A14B}" dt="2021-01-15T17:55:19.197" v="1454" actId="20577"/>
+          <ac:spMkLst>
+            <pc:docMk/>
+            <pc:sldMk cId="2092622795" sldId="296"/>
+            <ac:spMk id="4" creationId="{36126143-832A-4E8D-B6DE-213C571768D7}"/>
+          </ac:spMkLst>
+        </pc:spChg>
+      </pc:sldChg>
+      <pc:sldChg chg="delSp modSp add">
+        <pc:chgData name="Md Kauser Ahmmed" userId="81e39d19-8d5c-4ffe-9a82-20799efac8e0" providerId="ADAL" clId="{493F2EBC-02EC-4170-8502-33D60480A14B}" dt="2021-01-15T17:48:19.475" v="1258" actId="122"/>
+        <pc:sldMkLst>
+          <pc:docMk/>
+          <pc:sldMk cId="418254397" sldId="297"/>
+        </pc:sldMkLst>
+        <pc:spChg chg="mod">
+          <ac:chgData name="Md Kauser Ahmmed" userId="81e39d19-8d5c-4ffe-9a82-20799efac8e0" providerId="ADAL" clId="{493F2EBC-02EC-4170-8502-33D60480A14B}" dt="2021-01-15T17:48:19.475" v="1258" actId="122"/>
+          <ac:spMkLst>
+            <pc:docMk/>
+            <pc:sldMk cId="418254397" sldId="297"/>
+            <ac:spMk id="2" creationId="{8378AEE8-C173-45AB-910C-AA017D072967}"/>
+          </ac:spMkLst>
+        </pc:spChg>
+        <pc:spChg chg="del">
+          <ac:chgData name="Md Kauser Ahmmed" userId="81e39d19-8d5c-4ffe-9a82-20799efac8e0" providerId="ADAL" clId="{493F2EBC-02EC-4170-8502-33D60480A14B}" dt="2021-01-15T17:48:11.693" v="1217" actId="478"/>
+          <ac:spMkLst>
+            <pc:docMk/>
+            <pc:sldMk cId="418254397" sldId="297"/>
+            <ac:spMk id="3" creationId="{C2D02DB4-CA8C-452B-816A-F7193C4C4112}"/>
+          </ac:spMkLst>
+        </pc:spChg>
+      </pc:sldChg>
+      <pc:sldChg chg="modSp add">
+        <pc:chgData name="Md Kauser Ahmmed" userId="81e39d19-8d5c-4ffe-9a82-20799efac8e0" providerId="ADAL" clId="{493F2EBC-02EC-4170-8502-33D60480A14B}" dt="2021-01-15T17:57:25.400" v="1489" actId="20577"/>
+        <pc:sldMkLst>
+          <pc:docMk/>
+          <pc:sldMk cId="2483931024" sldId="298"/>
+        </pc:sldMkLst>
+        <pc:spChg chg="mod">
+          <ac:chgData name="Md Kauser Ahmmed" userId="81e39d19-8d5c-4ffe-9a82-20799efac8e0" providerId="ADAL" clId="{493F2EBC-02EC-4170-8502-33D60480A14B}" dt="2021-01-15T17:57:25.400" v="1489" actId="20577"/>
+          <ac:spMkLst>
+            <pc:docMk/>
+            <pc:sldMk cId="2483931024" sldId="298"/>
+            <ac:spMk id="2" creationId="{2A32364B-E594-4014-AB37-6A6F82375CD6}"/>
+          </ac:spMkLst>
+        </pc:spChg>
+        <pc:spChg chg="mod">
+          <ac:chgData name="Md Kauser Ahmmed" userId="81e39d19-8d5c-4ffe-9a82-20799efac8e0" providerId="ADAL" clId="{493F2EBC-02EC-4170-8502-33D60480A14B}" dt="2021-01-15T17:57:14.701" v="1479" actId="20577"/>
+          <ac:spMkLst>
+            <pc:docMk/>
+            <pc:sldMk cId="2483931024" sldId="298"/>
+            <ac:spMk id="3" creationId="{FAF7EFD8-937E-4485-A5BE-D7EBC0477783}"/>
+          </ac:spMkLst>
+        </pc:spChg>
+      </pc:sldChg>
+      <pc:sldChg chg="modSp add">
+        <pc:chgData name="Md Kauser Ahmmed" userId="81e39d19-8d5c-4ffe-9a82-20799efac8e0" providerId="ADAL" clId="{493F2EBC-02EC-4170-8502-33D60480A14B}" dt="2021-01-15T18:04:41.506" v="1623" actId="20577"/>
+        <pc:sldMkLst>
+          <pc:docMk/>
+          <pc:sldMk cId="124394224" sldId="299"/>
+        </pc:sldMkLst>
+        <pc:spChg chg="mod">
+          <ac:chgData name="Md Kauser Ahmmed" userId="81e39d19-8d5c-4ffe-9a82-20799efac8e0" providerId="ADAL" clId="{493F2EBC-02EC-4170-8502-33D60480A14B}" dt="2021-01-15T18:04:41.506" v="1623" actId="20577"/>
+          <ac:spMkLst>
+            <pc:docMk/>
+            <pc:sldMk cId="124394224" sldId="299"/>
+            <ac:spMk id="3" creationId="{64F80B61-502D-47EC-86FD-28DA3D65A610}"/>
+          </ac:spMkLst>
+        </pc:spChg>
+      </pc:sldChg>
+      <pc:sldChg chg="modSp add">
+        <pc:chgData name="Md Kauser Ahmmed" userId="81e39d19-8d5c-4ffe-9a82-20799efac8e0" providerId="ADAL" clId="{493F2EBC-02EC-4170-8502-33D60480A14B}" dt="2021-01-15T18:06:10.474" v="1642" actId="20577"/>
+        <pc:sldMkLst>
+          <pc:docMk/>
+          <pc:sldMk cId="72126194" sldId="300"/>
+        </pc:sldMkLst>
+        <pc:spChg chg="mod">
+          <ac:chgData name="Md Kauser Ahmmed" userId="81e39d19-8d5c-4ffe-9a82-20799efac8e0" providerId="ADAL" clId="{493F2EBC-02EC-4170-8502-33D60480A14B}" dt="2021-01-15T18:06:10.474" v="1642" actId="20577"/>
+          <ac:spMkLst>
+            <pc:docMk/>
+            <pc:sldMk cId="72126194" sldId="300"/>
+            <ac:spMk id="3" creationId="{64F80B61-502D-47EC-86FD-28DA3D65A610}"/>
+          </ac:spMkLst>
+        </pc:spChg>
+      </pc:sldChg>
+      <pc:sldChg chg="add del">
+        <pc:chgData name="Md Kauser Ahmmed" userId="81e39d19-8d5c-4ffe-9a82-20799efac8e0" providerId="ADAL" clId="{493F2EBC-02EC-4170-8502-33D60480A14B}" dt="2021-01-15T18:05:15.614" v="1624" actId="2696"/>
+        <pc:sldMkLst>
+          <pc:docMk/>
+          <pc:sldMk cId="1402649591" sldId="300"/>
+        </pc:sldMkLst>
+      </pc:sldChg>
+      <pc:sldChg chg="addSp delSp modSp add mod setBg delDesignElem modNotesTx">
+        <pc:chgData name="Md Kauser Ahmmed" userId="81e39d19-8d5c-4ffe-9a82-20799efac8e0" providerId="ADAL" clId="{493F2EBC-02EC-4170-8502-33D60480A14B}" dt="2021-01-15T18:18:21.451" v="1741" actId="20577"/>
+        <pc:sldMkLst>
+          <pc:docMk/>
+          <pc:sldMk cId="266561394" sldId="301"/>
+        </pc:sldMkLst>
+        <pc:spChg chg="mod">
+          <ac:chgData name="Md Kauser Ahmmed" userId="81e39d19-8d5c-4ffe-9a82-20799efac8e0" providerId="ADAL" clId="{493F2EBC-02EC-4170-8502-33D60480A14B}" dt="2021-01-15T18:17:24.904" v="1661" actId="20577"/>
+          <ac:spMkLst>
+            <pc:docMk/>
+            <pc:sldMk cId="266561394" sldId="301"/>
+            <ac:spMk id="2" creationId="{67336AB1-F8D3-4CB3-A161-02F750F9D74B}"/>
+          </ac:spMkLst>
+        </pc:spChg>
+        <pc:spChg chg="add">
+          <ac:chgData name="Md Kauser Ahmmed" userId="81e39d19-8d5c-4ffe-9a82-20799efac8e0" providerId="ADAL" clId="{493F2EBC-02EC-4170-8502-33D60480A14B}" dt="2021-01-15T18:17:18.786" v="1651" actId="26606"/>
+          <ac:spMkLst>
+            <pc:docMk/>
+            <pc:sldMk cId="266561394" sldId="301"/>
+            <ac:spMk id="9" creationId="{53F29798-D584-4792-9B62-3F5F5C36D619}"/>
+          </ac:spMkLst>
+        </pc:spChg>
+        <pc:spChg chg="del">
+          <ac:chgData name="Md Kauser Ahmmed" userId="81e39d19-8d5c-4ffe-9a82-20799efac8e0" providerId="ADAL" clId="{493F2EBC-02EC-4170-8502-33D60480A14B}" dt="2021-01-15T18:17:05.662" v="1646"/>
+          <ac:spMkLst>
+            <pc:docMk/>
+            <pc:sldMk cId="266561394" sldId="301"/>
+            <ac:spMk id="10" creationId="{53F29798-D584-4792-9B62-3F5F5C36D619}"/>
+          </ac:spMkLst>
+        </pc:spChg>
+        <pc:picChg chg="add mod">
+          <ac:chgData name="Md Kauser Ahmmed" userId="81e39d19-8d5c-4ffe-9a82-20799efac8e0" providerId="ADAL" clId="{493F2EBC-02EC-4170-8502-33D60480A14B}" dt="2021-01-15T18:17:18.786" v="1651" actId="26606"/>
+          <ac:picMkLst>
+            <pc:docMk/>
+            <pc:sldMk cId="266561394" sldId="301"/>
+            <ac:picMk id="4" creationId="{B63F8C53-D1B5-4C8F-9B99-8D3DF3E0464F}"/>
+          </ac:picMkLst>
+        </pc:picChg>
+        <pc:picChg chg="del">
+          <ac:chgData name="Md Kauser Ahmmed" userId="81e39d19-8d5c-4ffe-9a82-20799efac8e0" providerId="ADAL" clId="{493F2EBC-02EC-4170-8502-33D60480A14B}" dt="2021-01-15T18:17:09.326" v="1647" actId="478"/>
+          <ac:picMkLst>
+            <pc:docMk/>
+            <pc:sldMk cId="266561394" sldId="301"/>
+            <ac:picMk id="5" creationId="{4B0A2808-FBDE-4B81-ABD0-DF969D466F48}"/>
+          </ac:picMkLst>
+        </pc:picChg>
+      </pc:sldChg>
+      <pc:sldChg chg="add del">
+        <pc:chgData name="Md Kauser Ahmmed" userId="81e39d19-8d5c-4ffe-9a82-20799efac8e0" providerId="ADAL" clId="{493F2EBC-02EC-4170-8502-33D60480A14B}" dt="2021-01-15T18:17:03.096" v="1644" actId="2696"/>
+        <pc:sldMkLst>
+          <pc:docMk/>
+          <pc:sldMk cId="3922705545" sldId="301"/>
+        </pc:sldMkLst>
+      </pc:sldChg>
+      <pc:sldChg chg="modSp add mod">
+        <pc:chgData name="Md Kauser Ahmmed" userId="81e39d19-8d5c-4ffe-9a82-20799efac8e0" providerId="ADAL" clId="{493F2EBC-02EC-4170-8502-33D60480A14B}" dt="2021-01-22T17:40:59.021" v="1909" actId="20577"/>
+        <pc:sldMkLst>
+          <pc:docMk/>
+          <pc:sldMk cId="1685443532" sldId="302"/>
+        </pc:sldMkLst>
+        <pc:spChg chg="mod">
+          <ac:chgData name="Md Kauser Ahmmed" userId="81e39d19-8d5c-4ffe-9a82-20799efac8e0" providerId="ADAL" clId="{493F2EBC-02EC-4170-8502-33D60480A14B}" dt="2021-01-22T17:36:51.683" v="1851" actId="20577"/>
+          <ac:spMkLst>
+            <pc:docMk/>
+            <pc:sldMk cId="1685443532" sldId="302"/>
+            <ac:spMk id="2" creationId="{738B26C2-4373-446B-8029-46FFEC6F3E56}"/>
+          </ac:spMkLst>
+        </pc:spChg>
+        <pc:spChg chg="mod">
+          <ac:chgData name="Md Kauser Ahmmed" userId="81e39d19-8d5c-4ffe-9a82-20799efac8e0" providerId="ADAL" clId="{493F2EBC-02EC-4170-8502-33D60480A14B}" dt="2021-01-22T17:40:59.021" v="1909" actId="20577"/>
+          <ac:spMkLst>
+            <pc:docMk/>
+            <pc:sldMk cId="1685443532" sldId="302"/>
+            <ac:spMk id="4" creationId="{36126143-832A-4E8D-B6DE-213C571768D7}"/>
+          </ac:spMkLst>
+        </pc:spChg>
+      </pc:sldChg>
+      <pc:sldChg chg="modSp add mod">
+        <pc:chgData name="Md Kauser Ahmmed" userId="81e39d19-8d5c-4ffe-9a82-20799efac8e0" providerId="ADAL" clId="{493F2EBC-02EC-4170-8502-33D60480A14B}" dt="2021-01-22T17:44:34.640" v="1995" actId="20577"/>
+        <pc:sldMkLst>
+          <pc:docMk/>
+          <pc:sldMk cId="1132210515" sldId="303"/>
+        </pc:sldMkLst>
+        <pc:spChg chg="mod">
+          <ac:chgData name="Md Kauser Ahmmed" userId="81e39d19-8d5c-4ffe-9a82-20799efac8e0" providerId="ADAL" clId="{493F2EBC-02EC-4170-8502-33D60480A14B}" dt="2021-01-22T17:41:21.777" v="1921" actId="20577"/>
+          <ac:spMkLst>
+            <pc:docMk/>
+            <pc:sldMk cId="1132210515" sldId="303"/>
+            <ac:spMk id="2" creationId="{738B26C2-4373-446B-8029-46FFEC6F3E56}"/>
+          </ac:spMkLst>
+        </pc:spChg>
+        <pc:spChg chg="mod">
+          <ac:chgData name="Md Kauser Ahmmed" userId="81e39d19-8d5c-4ffe-9a82-20799efac8e0" providerId="ADAL" clId="{493F2EBC-02EC-4170-8502-33D60480A14B}" dt="2021-01-22T17:44:34.640" v="1995" actId="20577"/>
+          <ac:spMkLst>
+            <pc:docMk/>
+            <pc:sldMk cId="1132210515" sldId="303"/>
+            <ac:spMk id="4" creationId="{36126143-832A-4E8D-B6DE-213C571768D7}"/>
+          </ac:spMkLst>
+        </pc:spChg>
+      </pc:sldChg>
+    </pc:docChg>
+  </pc:docChgLst>
+  <pc:docChgLst>
     <pc:chgData name="Md Kauser Ahmmed" userId="81e39d19-8d5c-4ffe-9a82-20799efac8e0" providerId="ADAL" clId="{EAD71891-F6FA-4E9E-9E45-C4153614AC48}"/>
     <pc:docChg chg="undo custSel mod addSld delSld modSld sldOrd">
       <pc:chgData name="Md Kauser Ahmmed" userId="81e39d19-8d5c-4ffe-9a82-20799efac8e0" providerId="ADAL" clId="{EAD71891-F6FA-4E9E-9E45-C4153614AC48}" dt="2021-02-11T17:27:18.950" v="550" actId="20577"/>
@@ -1100,6 +1545,364 @@
             <ac:picMk id="5" creationId="{ACBD6B9E-A4E4-412F-B4D4-11630B00D8A5}"/>
           </ac:picMkLst>
         </pc:picChg>
+      </pc:sldChg>
+    </pc:docChg>
+  </pc:docChgLst>
+  <pc:docChgLst>
+    <pc:chgData name="Md Kauser Ahmmed" userId="81e39d19-8d5c-4ffe-9a82-20799efac8e0" providerId="ADAL" clId="{4DBB0182-D948-422F-9F4E-BA3A2E2584B9}"/>
+    <pc:docChg chg="undo custSel mod addSld delSld modSld">
+      <pc:chgData name="Md Kauser Ahmmed" userId="81e39d19-8d5c-4ffe-9a82-20799efac8e0" providerId="ADAL" clId="{4DBB0182-D948-422F-9F4E-BA3A2E2584B9}" dt="2021-01-29T19:02:25.358" v="1096" actId="14734"/>
+      <pc:docMkLst>
+        <pc:docMk/>
+      </pc:docMkLst>
+      <pc:sldChg chg="modSp mod">
+        <pc:chgData name="Md Kauser Ahmmed" userId="81e39d19-8d5c-4ffe-9a82-20799efac8e0" providerId="ADAL" clId="{4DBB0182-D948-422F-9F4E-BA3A2E2584B9}" dt="2021-01-29T16:50:56.115" v="1" actId="20577"/>
+        <pc:sldMkLst>
+          <pc:docMk/>
+          <pc:sldMk cId="2006097519" sldId="256"/>
+        </pc:sldMkLst>
+        <pc:spChg chg="mod">
+          <ac:chgData name="Md Kauser Ahmmed" userId="81e39d19-8d5c-4ffe-9a82-20799efac8e0" providerId="ADAL" clId="{4DBB0182-D948-422F-9F4E-BA3A2E2584B9}" dt="2021-01-29T16:50:56.115" v="1" actId="20577"/>
+          <ac:spMkLst>
+            <pc:docMk/>
+            <pc:sldMk cId="2006097519" sldId="256"/>
+            <ac:spMk id="3" creationId="{4A796019-1174-416E-99B9-9CF117EE3B6F}"/>
+          </ac:spMkLst>
+        </pc:spChg>
+      </pc:sldChg>
+      <pc:sldChg chg="addSp delSp modSp mod modNotesTx">
+        <pc:chgData name="Md Kauser Ahmmed" userId="81e39d19-8d5c-4ffe-9a82-20799efac8e0" providerId="ADAL" clId="{4DBB0182-D948-422F-9F4E-BA3A2E2584B9}" dt="2021-01-29T18:35:14.945" v="1095" actId="20577"/>
+        <pc:sldMkLst>
+          <pc:docMk/>
+          <pc:sldMk cId="2706077540" sldId="294"/>
+        </pc:sldMkLst>
+        <pc:spChg chg="mod">
+          <ac:chgData name="Md Kauser Ahmmed" userId="81e39d19-8d5c-4ffe-9a82-20799efac8e0" providerId="ADAL" clId="{4DBB0182-D948-422F-9F4E-BA3A2E2584B9}" dt="2021-01-29T17:03:42.270" v="101" actId="26606"/>
+          <ac:spMkLst>
+            <pc:docMk/>
+            <pc:sldMk cId="2706077540" sldId="294"/>
+            <ac:spMk id="2" creationId="{67336AB1-F8D3-4CB3-A161-02F750F9D74B}"/>
+          </ac:spMkLst>
+        </pc:spChg>
+        <pc:spChg chg="add mod">
+          <ac:chgData name="Md Kauser Ahmmed" userId="81e39d19-8d5c-4ffe-9a82-20799efac8e0" providerId="ADAL" clId="{4DBB0182-D948-422F-9F4E-BA3A2E2584B9}" dt="2021-01-29T17:08:20.904" v="405" actId="20577"/>
+          <ac:spMkLst>
+            <pc:docMk/>
+            <pc:sldMk cId="2706077540" sldId="294"/>
+            <ac:spMk id="5" creationId="{8BDE0A4E-4937-48FB-8AC6-5B9BA9967CEE}"/>
+          </ac:spMkLst>
+        </pc:spChg>
+        <pc:spChg chg="del">
+          <ac:chgData name="Md Kauser Ahmmed" userId="81e39d19-8d5c-4ffe-9a82-20799efac8e0" providerId="ADAL" clId="{4DBB0182-D948-422F-9F4E-BA3A2E2584B9}" dt="2021-01-29T17:03:42.270" v="101" actId="26606"/>
+          <ac:spMkLst>
+            <pc:docMk/>
+            <pc:sldMk cId="2706077540" sldId="294"/>
+            <ac:spMk id="15" creationId="{53F29798-D584-4792-9B62-3F5F5C36D619}"/>
+          </ac:spMkLst>
+        </pc:spChg>
+        <pc:spChg chg="add">
+          <ac:chgData name="Md Kauser Ahmmed" userId="81e39d19-8d5c-4ffe-9a82-20799efac8e0" providerId="ADAL" clId="{4DBB0182-D948-422F-9F4E-BA3A2E2584B9}" dt="2021-01-29T17:03:42.270" v="101" actId="26606"/>
+          <ac:spMkLst>
+            <pc:docMk/>
+            <pc:sldMk cId="2706077540" sldId="294"/>
+            <ac:spMk id="20" creationId="{1045B59B-615E-4718-A150-42DE5D03E1C8}"/>
+          </ac:spMkLst>
+        </pc:spChg>
+        <pc:spChg chg="add">
+          <ac:chgData name="Md Kauser Ahmmed" userId="81e39d19-8d5c-4ffe-9a82-20799efac8e0" providerId="ADAL" clId="{4DBB0182-D948-422F-9F4E-BA3A2E2584B9}" dt="2021-01-29T17:03:42.270" v="101" actId="26606"/>
+          <ac:spMkLst>
+            <pc:docMk/>
+            <pc:sldMk cId="2706077540" sldId="294"/>
+            <ac:spMk id="22" creationId="{D6CF29CD-38B8-4924-BA11-6D60517487EF}"/>
+          </ac:spMkLst>
+        </pc:spChg>
+        <pc:graphicFrameChg chg="add mod modGraphic">
+          <ac:chgData name="Md Kauser Ahmmed" userId="81e39d19-8d5c-4ffe-9a82-20799efac8e0" providerId="ADAL" clId="{4DBB0182-D948-422F-9F4E-BA3A2E2584B9}" dt="2021-01-29T18:35:14.945" v="1095" actId="20577"/>
+          <ac:graphicFrameMkLst>
+            <pc:docMk/>
+            <pc:sldMk cId="2706077540" sldId="294"/>
+            <ac:graphicFrameMk id="3" creationId="{1431F11D-504D-4663-AADC-B78B5F811D45}"/>
+          </ac:graphicFrameMkLst>
+        </pc:graphicFrameChg>
+        <pc:picChg chg="del">
+          <ac:chgData name="Md Kauser Ahmmed" userId="81e39d19-8d5c-4ffe-9a82-20799efac8e0" providerId="ADAL" clId="{4DBB0182-D948-422F-9F4E-BA3A2E2584B9}" dt="2021-01-29T16:52:10.497" v="39" actId="478"/>
+          <ac:picMkLst>
+            <pc:docMk/>
+            <pc:sldMk cId="2706077540" sldId="294"/>
+            <ac:picMk id="4" creationId="{F646978B-E024-483A-9232-6FCCF4809C0C}"/>
+          </ac:picMkLst>
+        </pc:picChg>
+      </pc:sldChg>
+      <pc:sldChg chg="modSp mod">
+        <pc:chgData name="Md Kauser Ahmmed" userId="81e39d19-8d5c-4ffe-9a82-20799efac8e0" providerId="ADAL" clId="{4DBB0182-D948-422F-9F4E-BA3A2E2584B9}" dt="2021-01-29T18:08:14.533" v="1056" actId="20577"/>
+        <pc:sldMkLst>
+          <pc:docMk/>
+          <pc:sldMk cId="3757853394" sldId="304"/>
+        </pc:sldMkLst>
+        <pc:spChg chg="mod">
+          <ac:chgData name="Md Kauser Ahmmed" userId="81e39d19-8d5c-4ffe-9a82-20799efac8e0" providerId="ADAL" clId="{4DBB0182-D948-422F-9F4E-BA3A2E2584B9}" dt="2021-01-29T18:08:14.533" v="1056" actId="20577"/>
+          <ac:spMkLst>
+            <pc:docMk/>
+            <pc:sldMk cId="3757853394" sldId="304"/>
+            <ac:spMk id="2" creationId="{C87A91E3-C29D-4DDE-BB3A-4702FCC6AB6F}"/>
+          </ac:spMkLst>
+        </pc:spChg>
+      </pc:sldChg>
+      <pc:sldChg chg="modSp mod">
+        <pc:chgData name="Md Kauser Ahmmed" userId="81e39d19-8d5c-4ffe-9a82-20799efac8e0" providerId="ADAL" clId="{4DBB0182-D948-422F-9F4E-BA3A2E2584B9}" dt="2021-01-29T16:51:23.020" v="7" actId="20577"/>
+        <pc:sldMkLst>
+          <pc:docMk/>
+          <pc:sldMk cId="4123713712" sldId="305"/>
+        </pc:sldMkLst>
+        <pc:spChg chg="mod">
+          <ac:chgData name="Md Kauser Ahmmed" userId="81e39d19-8d5c-4ffe-9a82-20799efac8e0" providerId="ADAL" clId="{4DBB0182-D948-422F-9F4E-BA3A2E2584B9}" dt="2021-01-29T16:51:23.020" v="7" actId="20577"/>
+          <ac:spMkLst>
+            <pc:docMk/>
+            <pc:sldMk cId="4123713712" sldId="305"/>
+            <ac:spMk id="3" creationId="{536440B4-0F32-4E6F-879A-258FDDE8E431}"/>
+          </ac:spMkLst>
+        </pc:spChg>
+      </pc:sldChg>
+      <pc:sldChg chg="del">
+        <pc:chgData name="Md Kauser Ahmmed" userId="81e39d19-8d5c-4ffe-9a82-20799efac8e0" providerId="ADAL" clId="{4DBB0182-D948-422F-9F4E-BA3A2E2584B9}" dt="2021-01-29T17:04:57.333" v="102" actId="47"/>
+        <pc:sldMkLst>
+          <pc:docMk/>
+          <pc:sldMk cId="3621628250" sldId="306"/>
+        </pc:sldMkLst>
+      </pc:sldChg>
+      <pc:sldChg chg="addSp delSp modSp new mod">
+        <pc:chgData name="Md Kauser Ahmmed" userId="81e39d19-8d5c-4ffe-9a82-20799efac8e0" providerId="ADAL" clId="{4DBB0182-D948-422F-9F4E-BA3A2E2584B9}" dt="2021-01-29T17:18:37.397" v="934" actId="255"/>
+        <pc:sldMkLst>
+          <pc:docMk/>
+          <pc:sldMk cId="2843596925" sldId="308"/>
+        </pc:sldMkLst>
+        <pc:spChg chg="mod">
+          <ac:chgData name="Md Kauser Ahmmed" userId="81e39d19-8d5c-4ffe-9a82-20799efac8e0" providerId="ADAL" clId="{4DBB0182-D948-422F-9F4E-BA3A2E2584B9}" dt="2021-01-29T17:18:37.397" v="934" actId="255"/>
+          <ac:spMkLst>
+            <pc:docMk/>
+            <pc:sldMk cId="2843596925" sldId="308"/>
+            <ac:spMk id="2" creationId="{290BC9A3-7C7D-4111-AECB-BAA0E40077E8}"/>
+          </ac:spMkLst>
+        </pc:spChg>
+        <pc:spChg chg="del">
+          <ac:chgData name="Md Kauser Ahmmed" userId="81e39d19-8d5c-4ffe-9a82-20799efac8e0" providerId="ADAL" clId="{4DBB0182-D948-422F-9F4E-BA3A2E2584B9}" dt="2021-01-29T17:09:21.270" v="406" actId="931"/>
+          <ac:spMkLst>
+            <pc:docMk/>
+            <pc:sldMk cId="2843596925" sldId="308"/>
+            <ac:spMk id="3" creationId="{3075FE2A-CADB-47BE-BDC3-2B0F1D5D0F8B}"/>
+          </ac:spMkLst>
+        </pc:spChg>
+        <pc:spChg chg="add mod">
+          <ac:chgData name="Md Kauser Ahmmed" userId="81e39d19-8d5c-4ffe-9a82-20799efac8e0" providerId="ADAL" clId="{4DBB0182-D948-422F-9F4E-BA3A2E2584B9}" dt="2021-01-29T17:16:37.375" v="878" actId="1035"/>
+          <ac:spMkLst>
+            <pc:docMk/>
+            <pc:sldMk cId="2843596925" sldId="308"/>
+            <ac:spMk id="6" creationId="{001B442E-2ADC-4F55-AF30-D5DF6DCB1C52}"/>
+          </ac:spMkLst>
+        </pc:spChg>
+        <pc:picChg chg="add mod">
+          <ac:chgData name="Md Kauser Ahmmed" userId="81e39d19-8d5c-4ffe-9a82-20799efac8e0" providerId="ADAL" clId="{4DBB0182-D948-422F-9F4E-BA3A2E2584B9}" dt="2021-01-29T17:16:23.934" v="842" actId="1076"/>
+          <ac:picMkLst>
+            <pc:docMk/>
+            <pc:sldMk cId="2843596925" sldId="308"/>
+            <ac:picMk id="5" creationId="{2579B157-5A44-41ED-B7D0-D5DBE320E23A}"/>
+          </ac:picMkLst>
+        </pc:picChg>
+      </pc:sldChg>
+      <pc:sldChg chg="addSp delSp modSp new mod">
+        <pc:chgData name="Md Kauser Ahmmed" userId="81e39d19-8d5c-4ffe-9a82-20799efac8e0" providerId="ADAL" clId="{4DBB0182-D948-422F-9F4E-BA3A2E2584B9}" dt="2021-01-29T17:18:16.927" v="933" actId="20577"/>
+        <pc:sldMkLst>
+          <pc:docMk/>
+          <pc:sldMk cId="2572824103" sldId="309"/>
+        </pc:sldMkLst>
+        <pc:spChg chg="mod">
+          <ac:chgData name="Md Kauser Ahmmed" userId="81e39d19-8d5c-4ffe-9a82-20799efac8e0" providerId="ADAL" clId="{4DBB0182-D948-422F-9F4E-BA3A2E2584B9}" dt="2021-01-29T17:18:16.927" v="933" actId="20577"/>
+          <ac:spMkLst>
+            <pc:docMk/>
+            <pc:sldMk cId="2572824103" sldId="309"/>
+            <ac:spMk id="2" creationId="{86004126-2FB1-40D2-AEF9-0B74E49850BB}"/>
+          </ac:spMkLst>
+        </pc:spChg>
+        <pc:spChg chg="del">
+          <ac:chgData name="Md Kauser Ahmmed" userId="81e39d19-8d5c-4ffe-9a82-20799efac8e0" providerId="ADAL" clId="{4DBB0182-D948-422F-9F4E-BA3A2E2584B9}" dt="2021-01-29T17:10:02.663" v="439" actId="931"/>
+          <ac:spMkLst>
+            <pc:docMk/>
+            <pc:sldMk cId="2572824103" sldId="309"/>
+            <ac:spMk id="3" creationId="{D57B6AB6-F3B2-4DD6-99EE-DD330329D679}"/>
+          </ac:spMkLst>
+        </pc:spChg>
+        <pc:spChg chg="add del mod">
+          <ac:chgData name="Md Kauser Ahmmed" userId="81e39d19-8d5c-4ffe-9a82-20799efac8e0" providerId="ADAL" clId="{4DBB0182-D948-422F-9F4E-BA3A2E2584B9}" dt="2021-01-29T17:10:52.137" v="443" actId="931"/>
+          <ac:spMkLst>
+            <pc:docMk/>
+            <pc:sldMk cId="2572824103" sldId="309"/>
+            <ac:spMk id="7" creationId="{6D6A5E37-736F-4BB9-94EA-E8555317FFF0}"/>
+          </ac:spMkLst>
+        </pc:spChg>
+        <pc:spChg chg="add mod">
+          <ac:chgData name="Md Kauser Ahmmed" userId="81e39d19-8d5c-4ffe-9a82-20799efac8e0" providerId="ADAL" clId="{4DBB0182-D948-422F-9F4E-BA3A2E2584B9}" dt="2021-01-29T17:16:57.741" v="881"/>
+          <ac:spMkLst>
+            <pc:docMk/>
+            <pc:sldMk cId="2572824103" sldId="309"/>
+            <ac:spMk id="10" creationId="{78F45A02-2BA4-4A83-B309-B18D8D471DA1}"/>
+          </ac:spMkLst>
+        </pc:spChg>
+        <pc:picChg chg="add del mod">
+          <ac:chgData name="Md Kauser Ahmmed" userId="81e39d19-8d5c-4ffe-9a82-20799efac8e0" providerId="ADAL" clId="{4DBB0182-D948-422F-9F4E-BA3A2E2584B9}" dt="2021-01-29T17:10:44.278" v="442" actId="478"/>
+          <ac:picMkLst>
+            <pc:docMk/>
+            <pc:sldMk cId="2572824103" sldId="309"/>
+            <ac:picMk id="5" creationId="{76802D68-423F-44B6-8E6F-EC783110EA80}"/>
+          </ac:picMkLst>
+        </pc:picChg>
+        <pc:picChg chg="add mod">
+          <ac:chgData name="Md Kauser Ahmmed" userId="81e39d19-8d5c-4ffe-9a82-20799efac8e0" providerId="ADAL" clId="{4DBB0182-D948-422F-9F4E-BA3A2E2584B9}" dt="2021-01-29T17:16:50.735" v="880" actId="1076"/>
+          <ac:picMkLst>
+            <pc:docMk/>
+            <pc:sldMk cId="2572824103" sldId="309"/>
+            <ac:picMk id="9" creationId="{90B2A0BE-9D6C-4A9C-831D-3CEAC9A8E303}"/>
+          </ac:picMkLst>
+        </pc:picChg>
+      </pc:sldChg>
+      <pc:sldChg chg="addSp delSp modSp new mod">
+        <pc:chgData name="Md Kauser Ahmmed" userId="81e39d19-8d5c-4ffe-9a82-20799efac8e0" providerId="ADAL" clId="{4DBB0182-D948-422F-9F4E-BA3A2E2584B9}" dt="2021-01-29T17:20:08.241" v="964" actId="962"/>
+        <pc:sldMkLst>
+          <pc:docMk/>
+          <pc:sldMk cId="4069352828" sldId="310"/>
+        </pc:sldMkLst>
+        <pc:spChg chg="mod">
+          <ac:chgData name="Md Kauser Ahmmed" userId="81e39d19-8d5c-4ffe-9a82-20799efac8e0" providerId="ADAL" clId="{4DBB0182-D948-422F-9F4E-BA3A2E2584B9}" dt="2021-01-29T17:19:21.965" v="960" actId="20577"/>
+          <ac:spMkLst>
+            <pc:docMk/>
+            <pc:sldMk cId="4069352828" sldId="310"/>
+            <ac:spMk id="2" creationId="{31EE8F9E-C635-4FF1-AAE5-6957CB8FB6D0}"/>
+          </ac:spMkLst>
+        </pc:spChg>
+        <pc:spChg chg="del">
+          <ac:chgData name="Md Kauser Ahmmed" userId="81e39d19-8d5c-4ffe-9a82-20799efac8e0" providerId="ADAL" clId="{4DBB0182-D948-422F-9F4E-BA3A2E2584B9}" dt="2021-01-29T17:20:02.142" v="961" actId="931"/>
+          <ac:spMkLst>
+            <pc:docMk/>
+            <pc:sldMk cId="4069352828" sldId="310"/>
+            <ac:spMk id="3" creationId="{CBE4A4E6-4A46-428C-AA18-5DCE21F39986}"/>
+          </ac:spMkLst>
+        </pc:spChg>
+        <pc:picChg chg="add mod">
+          <ac:chgData name="Md Kauser Ahmmed" userId="81e39d19-8d5c-4ffe-9a82-20799efac8e0" providerId="ADAL" clId="{4DBB0182-D948-422F-9F4E-BA3A2E2584B9}" dt="2021-01-29T17:20:08.241" v="964" actId="962"/>
+          <ac:picMkLst>
+            <pc:docMk/>
+            <pc:sldMk cId="4069352828" sldId="310"/>
+            <ac:picMk id="5" creationId="{7ABDC6C9-4AB9-4271-90CE-38C7F267207B}"/>
+          </ac:picMkLst>
+        </pc:picChg>
+      </pc:sldChg>
+      <pc:sldChg chg="addSp delSp modSp new mod">
+        <pc:chgData name="Md Kauser Ahmmed" userId="81e39d19-8d5c-4ffe-9a82-20799efac8e0" providerId="ADAL" clId="{4DBB0182-D948-422F-9F4E-BA3A2E2584B9}" dt="2021-01-29T17:20:46.512" v="976" actId="962"/>
+        <pc:sldMkLst>
+          <pc:docMk/>
+          <pc:sldMk cId="706604625" sldId="311"/>
+        </pc:sldMkLst>
+        <pc:spChg chg="mod">
+          <ac:chgData name="Md Kauser Ahmmed" userId="81e39d19-8d5c-4ffe-9a82-20799efac8e0" providerId="ADAL" clId="{4DBB0182-D948-422F-9F4E-BA3A2E2584B9}" dt="2021-01-29T17:20:35.433" v="973" actId="255"/>
+          <ac:spMkLst>
+            <pc:docMk/>
+            <pc:sldMk cId="706604625" sldId="311"/>
+            <ac:spMk id="2" creationId="{01237D72-F1B3-4455-859C-F93227383A1E}"/>
+          </ac:spMkLst>
+        </pc:spChg>
+        <pc:spChg chg="del">
+          <ac:chgData name="Md Kauser Ahmmed" userId="81e39d19-8d5c-4ffe-9a82-20799efac8e0" providerId="ADAL" clId="{4DBB0182-D948-422F-9F4E-BA3A2E2584B9}" dt="2021-01-29T17:20:44.112" v="974" actId="931"/>
+          <ac:spMkLst>
+            <pc:docMk/>
+            <pc:sldMk cId="706604625" sldId="311"/>
+            <ac:spMk id="3" creationId="{094CE0A3-0D33-49D6-AE1F-4BABC9172B3B}"/>
+          </ac:spMkLst>
+        </pc:spChg>
+        <pc:picChg chg="add mod">
+          <ac:chgData name="Md Kauser Ahmmed" userId="81e39d19-8d5c-4ffe-9a82-20799efac8e0" providerId="ADAL" clId="{4DBB0182-D948-422F-9F4E-BA3A2E2584B9}" dt="2021-01-29T17:20:46.512" v="976" actId="962"/>
+          <ac:picMkLst>
+            <pc:docMk/>
+            <pc:sldMk cId="706604625" sldId="311"/>
+            <ac:picMk id="5" creationId="{8F286E4F-3086-4745-BA8B-7F94AA54C4D0}"/>
+          </ac:picMkLst>
+        </pc:picChg>
+      </pc:sldChg>
+      <pc:sldChg chg="addSp delSp modSp new mod">
+        <pc:chgData name="Md Kauser Ahmmed" userId="81e39d19-8d5c-4ffe-9a82-20799efac8e0" providerId="ADAL" clId="{4DBB0182-D948-422F-9F4E-BA3A2E2584B9}" dt="2021-01-29T18:00:41.080" v="1046" actId="14100"/>
+        <pc:sldMkLst>
+          <pc:docMk/>
+          <pc:sldMk cId="3739373481" sldId="312"/>
+        </pc:sldMkLst>
+        <pc:spChg chg="mod">
+          <ac:chgData name="Md Kauser Ahmmed" userId="81e39d19-8d5c-4ffe-9a82-20799efac8e0" providerId="ADAL" clId="{4DBB0182-D948-422F-9F4E-BA3A2E2584B9}" dt="2021-01-29T17:59:33.192" v="1032" actId="20577"/>
+          <ac:spMkLst>
+            <pc:docMk/>
+            <pc:sldMk cId="3739373481" sldId="312"/>
+            <ac:spMk id="2" creationId="{F4E91E8C-AA70-40B4-B70F-A352E4F9D2DD}"/>
+          </ac:spMkLst>
+        </pc:spChg>
+        <pc:spChg chg="add del mod">
+          <ac:chgData name="Md Kauser Ahmmed" userId="81e39d19-8d5c-4ffe-9a82-20799efac8e0" providerId="ADAL" clId="{4DBB0182-D948-422F-9F4E-BA3A2E2584B9}" dt="2021-01-29T18:00:41.080" v="1046" actId="14100"/>
+          <ac:spMkLst>
+            <pc:docMk/>
+            <pc:sldMk cId="3739373481" sldId="312"/>
+            <ac:spMk id="3" creationId="{E2FDCB64-29A2-4230-A449-F77C8D203C20}"/>
+          </ac:spMkLst>
+        </pc:spChg>
+        <pc:spChg chg="add del mod">
+          <ac:chgData name="Md Kauser Ahmmed" userId="81e39d19-8d5c-4ffe-9a82-20799efac8e0" providerId="ADAL" clId="{4DBB0182-D948-422F-9F4E-BA3A2E2584B9}" dt="2021-01-29T17:59:41.759" v="1035"/>
+          <ac:spMkLst>
+            <pc:docMk/>
+            <pc:sldMk cId="3739373481" sldId="312"/>
+            <ac:spMk id="4" creationId="{4581D5A1-BE1F-440C-BF3E-A95FCF9064BE}"/>
+          </ac:spMkLst>
+        </pc:spChg>
+      </pc:sldChg>
+      <pc:sldChg chg="addSp delSp modSp new mod setBg">
+        <pc:chgData name="Md Kauser Ahmmed" userId="81e39d19-8d5c-4ffe-9a82-20799efac8e0" providerId="ADAL" clId="{4DBB0182-D948-422F-9F4E-BA3A2E2584B9}" dt="2021-01-29T19:02:25.358" v="1096" actId="14734"/>
+        <pc:sldMkLst>
+          <pc:docMk/>
+          <pc:sldMk cId="3844149522" sldId="313"/>
+        </pc:sldMkLst>
+        <pc:spChg chg="mod">
+          <ac:chgData name="Md Kauser Ahmmed" userId="81e39d19-8d5c-4ffe-9a82-20799efac8e0" providerId="ADAL" clId="{4DBB0182-D948-422F-9F4E-BA3A2E2584B9}" dt="2021-01-29T18:33:49.448" v="1094" actId="26606"/>
+          <ac:spMkLst>
+            <pc:docMk/>
+            <pc:sldMk cId="3844149522" sldId="313"/>
+            <ac:spMk id="2" creationId="{89463756-F4F3-4DCF-8E25-6AC5BA9DCA41}"/>
+          </ac:spMkLst>
+        </pc:spChg>
+        <pc:spChg chg="del">
+          <ac:chgData name="Md Kauser Ahmmed" userId="81e39d19-8d5c-4ffe-9a82-20799efac8e0" providerId="ADAL" clId="{4DBB0182-D948-422F-9F4E-BA3A2E2584B9}" dt="2021-01-29T18:32:39.175" v="1058"/>
+          <ac:spMkLst>
+            <pc:docMk/>
+            <pc:sldMk cId="3844149522" sldId="313"/>
+            <ac:spMk id="3" creationId="{2B8128AB-63CE-4AB4-B842-C70F6E57B330}"/>
+          </ac:spMkLst>
+        </pc:spChg>
+        <pc:spChg chg="add">
+          <ac:chgData name="Md Kauser Ahmmed" userId="81e39d19-8d5c-4ffe-9a82-20799efac8e0" providerId="ADAL" clId="{4DBB0182-D948-422F-9F4E-BA3A2E2584B9}" dt="2021-01-29T18:33:49.448" v="1094" actId="26606"/>
+          <ac:spMkLst>
+            <pc:docMk/>
+            <pc:sldMk cId="3844149522" sldId="313"/>
+            <ac:spMk id="9" creationId="{1045B59B-615E-4718-A150-42DE5D03E1C8}"/>
+          </ac:spMkLst>
+        </pc:spChg>
+        <pc:spChg chg="add">
+          <ac:chgData name="Md Kauser Ahmmed" userId="81e39d19-8d5c-4ffe-9a82-20799efac8e0" providerId="ADAL" clId="{4DBB0182-D948-422F-9F4E-BA3A2E2584B9}" dt="2021-01-29T18:33:49.448" v="1094" actId="26606"/>
+          <ac:spMkLst>
+            <pc:docMk/>
+            <pc:sldMk cId="3844149522" sldId="313"/>
+            <ac:spMk id="11" creationId="{D6CF29CD-38B8-4924-BA11-6D60517487EF}"/>
+          </ac:spMkLst>
+        </pc:spChg>
+        <pc:graphicFrameChg chg="add mod modGraphic">
+          <ac:chgData name="Md Kauser Ahmmed" userId="81e39d19-8d5c-4ffe-9a82-20799efac8e0" providerId="ADAL" clId="{4DBB0182-D948-422F-9F4E-BA3A2E2584B9}" dt="2021-01-29T19:02:25.358" v="1096" actId="14734"/>
+          <ac:graphicFrameMkLst>
+            <pc:docMk/>
+            <pc:sldMk cId="3844149522" sldId="313"/>
+            <ac:graphicFrameMk id="4" creationId="{A5968C8D-2CB5-407F-B06E-7BEAB3225CD9}"/>
+          </ac:graphicFrameMkLst>
+        </pc:graphicFrameChg>
       </pc:sldChg>
     </pc:docChg>
   </pc:docChgLst>
@@ -1421,809 +2224,6 @@
       </pc:sldChg>
     </pc:docChg>
   </pc:docChgLst>
-  <pc:docChgLst>
-    <pc:chgData name="Md Kauser Ahmmed" userId="81e39d19-8d5c-4ffe-9a82-20799efac8e0" providerId="ADAL" clId="{4DBB0182-D948-422F-9F4E-BA3A2E2584B9}"/>
-    <pc:docChg chg="undo custSel mod addSld delSld modSld">
-      <pc:chgData name="Md Kauser Ahmmed" userId="81e39d19-8d5c-4ffe-9a82-20799efac8e0" providerId="ADAL" clId="{4DBB0182-D948-422F-9F4E-BA3A2E2584B9}" dt="2021-01-29T19:02:25.358" v="1096" actId="14734"/>
-      <pc:docMkLst>
-        <pc:docMk/>
-      </pc:docMkLst>
-      <pc:sldChg chg="modSp mod">
-        <pc:chgData name="Md Kauser Ahmmed" userId="81e39d19-8d5c-4ffe-9a82-20799efac8e0" providerId="ADAL" clId="{4DBB0182-D948-422F-9F4E-BA3A2E2584B9}" dt="2021-01-29T16:50:56.115" v="1" actId="20577"/>
-        <pc:sldMkLst>
-          <pc:docMk/>
-          <pc:sldMk cId="2006097519" sldId="256"/>
-        </pc:sldMkLst>
-        <pc:spChg chg="mod">
-          <ac:chgData name="Md Kauser Ahmmed" userId="81e39d19-8d5c-4ffe-9a82-20799efac8e0" providerId="ADAL" clId="{4DBB0182-D948-422F-9F4E-BA3A2E2584B9}" dt="2021-01-29T16:50:56.115" v="1" actId="20577"/>
-          <ac:spMkLst>
-            <pc:docMk/>
-            <pc:sldMk cId="2006097519" sldId="256"/>
-            <ac:spMk id="3" creationId="{4A796019-1174-416E-99B9-9CF117EE3B6F}"/>
-          </ac:spMkLst>
-        </pc:spChg>
-      </pc:sldChg>
-      <pc:sldChg chg="addSp delSp modSp mod modNotesTx">
-        <pc:chgData name="Md Kauser Ahmmed" userId="81e39d19-8d5c-4ffe-9a82-20799efac8e0" providerId="ADAL" clId="{4DBB0182-D948-422F-9F4E-BA3A2E2584B9}" dt="2021-01-29T18:35:14.945" v="1095" actId="20577"/>
-        <pc:sldMkLst>
-          <pc:docMk/>
-          <pc:sldMk cId="2706077540" sldId="294"/>
-        </pc:sldMkLst>
-        <pc:spChg chg="mod">
-          <ac:chgData name="Md Kauser Ahmmed" userId="81e39d19-8d5c-4ffe-9a82-20799efac8e0" providerId="ADAL" clId="{4DBB0182-D948-422F-9F4E-BA3A2E2584B9}" dt="2021-01-29T17:03:42.270" v="101" actId="26606"/>
-          <ac:spMkLst>
-            <pc:docMk/>
-            <pc:sldMk cId="2706077540" sldId="294"/>
-            <ac:spMk id="2" creationId="{67336AB1-F8D3-4CB3-A161-02F750F9D74B}"/>
-          </ac:spMkLst>
-        </pc:spChg>
-        <pc:spChg chg="add mod">
-          <ac:chgData name="Md Kauser Ahmmed" userId="81e39d19-8d5c-4ffe-9a82-20799efac8e0" providerId="ADAL" clId="{4DBB0182-D948-422F-9F4E-BA3A2E2584B9}" dt="2021-01-29T17:08:20.904" v="405" actId="20577"/>
-          <ac:spMkLst>
-            <pc:docMk/>
-            <pc:sldMk cId="2706077540" sldId="294"/>
-            <ac:spMk id="5" creationId="{8BDE0A4E-4937-48FB-8AC6-5B9BA9967CEE}"/>
-          </ac:spMkLst>
-        </pc:spChg>
-        <pc:spChg chg="del">
-          <ac:chgData name="Md Kauser Ahmmed" userId="81e39d19-8d5c-4ffe-9a82-20799efac8e0" providerId="ADAL" clId="{4DBB0182-D948-422F-9F4E-BA3A2E2584B9}" dt="2021-01-29T17:03:42.270" v="101" actId="26606"/>
-          <ac:spMkLst>
-            <pc:docMk/>
-            <pc:sldMk cId="2706077540" sldId="294"/>
-            <ac:spMk id="15" creationId="{53F29798-D584-4792-9B62-3F5F5C36D619}"/>
-          </ac:spMkLst>
-        </pc:spChg>
-        <pc:spChg chg="add">
-          <ac:chgData name="Md Kauser Ahmmed" userId="81e39d19-8d5c-4ffe-9a82-20799efac8e0" providerId="ADAL" clId="{4DBB0182-D948-422F-9F4E-BA3A2E2584B9}" dt="2021-01-29T17:03:42.270" v="101" actId="26606"/>
-          <ac:spMkLst>
-            <pc:docMk/>
-            <pc:sldMk cId="2706077540" sldId="294"/>
-            <ac:spMk id="20" creationId="{1045B59B-615E-4718-A150-42DE5D03E1C8}"/>
-          </ac:spMkLst>
-        </pc:spChg>
-        <pc:spChg chg="add">
-          <ac:chgData name="Md Kauser Ahmmed" userId="81e39d19-8d5c-4ffe-9a82-20799efac8e0" providerId="ADAL" clId="{4DBB0182-D948-422F-9F4E-BA3A2E2584B9}" dt="2021-01-29T17:03:42.270" v="101" actId="26606"/>
-          <ac:spMkLst>
-            <pc:docMk/>
-            <pc:sldMk cId="2706077540" sldId="294"/>
-            <ac:spMk id="22" creationId="{D6CF29CD-38B8-4924-BA11-6D60517487EF}"/>
-          </ac:spMkLst>
-        </pc:spChg>
-        <pc:graphicFrameChg chg="add mod modGraphic">
-          <ac:chgData name="Md Kauser Ahmmed" userId="81e39d19-8d5c-4ffe-9a82-20799efac8e0" providerId="ADAL" clId="{4DBB0182-D948-422F-9F4E-BA3A2E2584B9}" dt="2021-01-29T18:35:14.945" v="1095" actId="20577"/>
-          <ac:graphicFrameMkLst>
-            <pc:docMk/>
-            <pc:sldMk cId="2706077540" sldId="294"/>
-            <ac:graphicFrameMk id="3" creationId="{1431F11D-504D-4663-AADC-B78B5F811D45}"/>
-          </ac:graphicFrameMkLst>
-        </pc:graphicFrameChg>
-        <pc:picChg chg="del">
-          <ac:chgData name="Md Kauser Ahmmed" userId="81e39d19-8d5c-4ffe-9a82-20799efac8e0" providerId="ADAL" clId="{4DBB0182-D948-422F-9F4E-BA3A2E2584B9}" dt="2021-01-29T16:52:10.497" v="39" actId="478"/>
-          <ac:picMkLst>
-            <pc:docMk/>
-            <pc:sldMk cId="2706077540" sldId="294"/>
-            <ac:picMk id="4" creationId="{F646978B-E024-483A-9232-6FCCF4809C0C}"/>
-          </ac:picMkLst>
-        </pc:picChg>
-      </pc:sldChg>
-      <pc:sldChg chg="modSp mod">
-        <pc:chgData name="Md Kauser Ahmmed" userId="81e39d19-8d5c-4ffe-9a82-20799efac8e0" providerId="ADAL" clId="{4DBB0182-D948-422F-9F4E-BA3A2E2584B9}" dt="2021-01-29T18:08:14.533" v="1056" actId="20577"/>
-        <pc:sldMkLst>
-          <pc:docMk/>
-          <pc:sldMk cId="3757853394" sldId="304"/>
-        </pc:sldMkLst>
-        <pc:spChg chg="mod">
-          <ac:chgData name="Md Kauser Ahmmed" userId="81e39d19-8d5c-4ffe-9a82-20799efac8e0" providerId="ADAL" clId="{4DBB0182-D948-422F-9F4E-BA3A2E2584B9}" dt="2021-01-29T18:08:14.533" v="1056" actId="20577"/>
-          <ac:spMkLst>
-            <pc:docMk/>
-            <pc:sldMk cId="3757853394" sldId="304"/>
-            <ac:spMk id="2" creationId="{C87A91E3-C29D-4DDE-BB3A-4702FCC6AB6F}"/>
-          </ac:spMkLst>
-        </pc:spChg>
-      </pc:sldChg>
-      <pc:sldChg chg="modSp mod">
-        <pc:chgData name="Md Kauser Ahmmed" userId="81e39d19-8d5c-4ffe-9a82-20799efac8e0" providerId="ADAL" clId="{4DBB0182-D948-422F-9F4E-BA3A2E2584B9}" dt="2021-01-29T16:51:23.020" v="7" actId="20577"/>
-        <pc:sldMkLst>
-          <pc:docMk/>
-          <pc:sldMk cId="4123713712" sldId="305"/>
-        </pc:sldMkLst>
-        <pc:spChg chg="mod">
-          <ac:chgData name="Md Kauser Ahmmed" userId="81e39d19-8d5c-4ffe-9a82-20799efac8e0" providerId="ADAL" clId="{4DBB0182-D948-422F-9F4E-BA3A2E2584B9}" dt="2021-01-29T16:51:23.020" v="7" actId="20577"/>
-          <ac:spMkLst>
-            <pc:docMk/>
-            <pc:sldMk cId="4123713712" sldId="305"/>
-            <ac:spMk id="3" creationId="{536440B4-0F32-4E6F-879A-258FDDE8E431}"/>
-          </ac:spMkLst>
-        </pc:spChg>
-      </pc:sldChg>
-      <pc:sldChg chg="del">
-        <pc:chgData name="Md Kauser Ahmmed" userId="81e39d19-8d5c-4ffe-9a82-20799efac8e0" providerId="ADAL" clId="{4DBB0182-D948-422F-9F4E-BA3A2E2584B9}" dt="2021-01-29T17:04:57.333" v="102" actId="47"/>
-        <pc:sldMkLst>
-          <pc:docMk/>
-          <pc:sldMk cId="3621628250" sldId="306"/>
-        </pc:sldMkLst>
-      </pc:sldChg>
-      <pc:sldChg chg="addSp delSp modSp new mod">
-        <pc:chgData name="Md Kauser Ahmmed" userId="81e39d19-8d5c-4ffe-9a82-20799efac8e0" providerId="ADAL" clId="{4DBB0182-D948-422F-9F4E-BA3A2E2584B9}" dt="2021-01-29T17:18:37.397" v="934" actId="255"/>
-        <pc:sldMkLst>
-          <pc:docMk/>
-          <pc:sldMk cId="2843596925" sldId="308"/>
-        </pc:sldMkLst>
-        <pc:spChg chg="mod">
-          <ac:chgData name="Md Kauser Ahmmed" userId="81e39d19-8d5c-4ffe-9a82-20799efac8e0" providerId="ADAL" clId="{4DBB0182-D948-422F-9F4E-BA3A2E2584B9}" dt="2021-01-29T17:18:37.397" v="934" actId="255"/>
-          <ac:spMkLst>
-            <pc:docMk/>
-            <pc:sldMk cId="2843596925" sldId="308"/>
-            <ac:spMk id="2" creationId="{290BC9A3-7C7D-4111-AECB-BAA0E40077E8}"/>
-          </ac:spMkLst>
-        </pc:spChg>
-        <pc:spChg chg="del">
-          <ac:chgData name="Md Kauser Ahmmed" userId="81e39d19-8d5c-4ffe-9a82-20799efac8e0" providerId="ADAL" clId="{4DBB0182-D948-422F-9F4E-BA3A2E2584B9}" dt="2021-01-29T17:09:21.270" v="406" actId="931"/>
-          <ac:spMkLst>
-            <pc:docMk/>
-            <pc:sldMk cId="2843596925" sldId="308"/>
-            <ac:spMk id="3" creationId="{3075FE2A-CADB-47BE-BDC3-2B0F1D5D0F8B}"/>
-          </ac:spMkLst>
-        </pc:spChg>
-        <pc:spChg chg="add mod">
-          <ac:chgData name="Md Kauser Ahmmed" userId="81e39d19-8d5c-4ffe-9a82-20799efac8e0" providerId="ADAL" clId="{4DBB0182-D948-422F-9F4E-BA3A2E2584B9}" dt="2021-01-29T17:16:37.375" v="878" actId="1035"/>
-          <ac:spMkLst>
-            <pc:docMk/>
-            <pc:sldMk cId="2843596925" sldId="308"/>
-            <ac:spMk id="6" creationId="{001B442E-2ADC-4F55-AF30-D5DF6DCB1C52}"/>
-          </ac:spMkLst>
-        </pc:spChg>
-        <pc:picChg chg="add mod">
-          <ac:chgData name="Md Kauser Ahmmed" userId="81e39d19-8d5c-4ffe-9a82-20799efac8e0" providerId="ADAL" clId="{4DBB0182-D948-422F-9F4E-BA3A2E2584B9}" dt="2021-01-29T17:16:23.934" v="842" actId="1076"/>
-          <ac:picMkLst>
-            <pc:docMk/>
-            <pc:sldMk cId="2843596925" sldId="308"/>
-            <ac:picMk id="5" creationId="{2579B157-5A44-41ED-B7D0-D5DBE320E23A}"/>
-          </ac:picMkLst>
-        </pc:picChg>
-      </pc:sldChg>
-      <pc:sldChg chg="addSp delSp modSp new mod">
-        <pc:chgData name="Md Kauser Ahmmed" userId="81e39d19-8d5c-4ffe-9a82-20799efac8e0" providerId="ADAL" clId="{4DBB0182-D948-422F-9F4E-BA3A2E2584B9}" dt="2021-01-29T17:18:16.927" v="933" actId="20577"/>
-        <pc:sldMkLst>
-          <pc:docMk/>
-          <pc:sldMk cId="2572824103" sldId="309"/>
-        </pc:sldMkLst>
-        <pc:spChg chg="mod">
-          <ac:chgData name="Md Kauser Ahmmed" userId="81e39d19-8d5c-4ffe-9a82-20799efac8e0" providerId="ADAL" clId="{4DBB0182-D948-422F-9F4E-BA3A2E2584B9}" dt="2021-01-29T17:18:16.927" v="933" actId="20577"/>
-          <ac:spMkLst>
-            <pc:docMk/>
-            <pc:sldMk cId="2572824103" sldId="309"/>
-            <ac:spMk id="2" creationId="{86004126-2FB1-40D2-AEF9-0B74E49850BB}"/>
-          </ac:spMkLst>
-        </pc:spChg>
-        <pc:spChg chg="del">
-          <ac:chgData name="Md Kauser Ahmmed" userId="81e39d19-8d5c-4ffe-9a82-20799efac8e0" providerId="ADAL" clId="{4DBB0182-D948-422F-9F4E-BA3A2E2584B9}" dt="2021-01-29T17:10:02.663" v="439" actId="931"/>
-          <ac:spMkLst>
-            <pc:docMk/>
-            <pc:sldMk cId="2572824103" sldId="309"/>
-            <ac:spMk id="3" creationId="{D57B6AB6-F3B2-4DD6-99EE-DD330329D679}"/>
-          </ac:spMkLst>
-        </pc:spChg>
-        <pc:spChg chg="add del mod">
-          <ac:chgData name="Md Kauser Ahmmed" userId="81e39d19-8d5c-4ffe-9a82-20799efac8e0" providerId="ADAL" clId="{4DBB0182-D948-422F-9F4E-BA3A2E2584B9}" dt="2021-01-29T17:10:52.137" v="443" actId="931"/>
-          <ac:spMkLst>
-            <pc:docMk/>
-            <pc:sldMk cId="2572824103" sldId="309"/>
-            <ac:spMk id="7" creationId="{6D6A5E37-736F-4BB9-94EA-E8555317FFF0}"/>
-          </ac:spMkLst>
-        </pc:spChg>
-        <pc:spChg chg="add mod">
-          <ac:chgData name="Md Kauser Ahmmed" userId="81e39d19-8d5c-4ffe-9a82-20799efac8e0" providerId="ADAL" clId="{4DBB0182-D948-422F-9F4E-BA3A2E2584B9}" dt="2021-01-29T17:16:57.741" v="881"/>
-          <ac:spMkLst>
-            <pc:docMk/>
-            <pc:sldMk cId="2572824103" sldId="309"/>
-            <ac:spMk id="10" creationId="{78F45A02-2BA4-4A83-B309-B18D8D471DA1}"/>
-          </ac:spMkLst>
-        </pc:spChg>
-        <pc:picChg chg="add del mod">
-          <ac:chgData name="Md Kauser Ahmmed" userId="81e39d19-8d5c-4ffe-9a82-20799efac8e0" providerId="ADAL" clId="{4DBB0182-D948-422F-9F4E-BA3A2E2584B9}" dt="2021-01-29T17:10:44.278" v="442" actId="478"/>
-          <ac:picMkLst>
-            <pc:docMk/>
-            <pc:sldMk cId="2572824103" sldId="309"/>
-            <ac:picMk id="5" creationId="{76802D68-423F-44B6-8E6F-EC783110EA80}"/>
-          </ac:picMkLst>
-        </pc:picChg>
-        <pc:picChg chg="add mod">
-          <ac:chgData name="Md Kauser Ahmmed" userId="81e39d19-8d5c-4ffe-9a82-20799efac8e0" providerId="ADAL" clId="{4DBB0182-D948-422F-9F4E-BA3A2E2584B9}" dt="2021-01-29T17:16:50.735" v="880" actId="1076"/>
-          <ac:picMkLst>
-            <pc:docMk/>
-            <pc:sldMk cId="2572824103" sldId="309"/>
-            <ac:picMk id="9" creationId="{90B2A0BE-9D6C-4A9C-831D-3CEAC9A8E303}"/>
-          </ac:picMkLst>
-        </pc:picChg>
-      </pc:sldChg>
-      <pc:sldChg chg="addSp delSp modSp new mod">
-        <pc:chgData name="Md Kauser Ahmmed" userId="81e39d19-8d5c-4ffe-9a82-20799efac8e0" providerId="ADAL" clId="{4DBB0182-D948-422F-9F4E-BA3A2E2584B9}" dt="2021-01-29T17:20:08.241" v="964" actId="962"/>
-        <pc:sldMkLst>
-          <pc:docMk/>
-          <pc:sldMk cId="4069352828" sldId="310"/>
-        </pc:sldMkLst>
-        <pc:spChg chg="mod">
-          <ac:chgData name="Md Kauser Ahmmed" userId="81e39d19-8d5c-4ffe-9a82-20799efac8e0" providerId="ADAL" clId="{4DBB0182-D948-422F-9F4E-BA3A2E2584B9}" dt="2021-01-29T17:19:21.965" v="960" actId="20577"/>
-          <ac:spMkLst>
-            <pc:docMk/>
-            <pc:sldMk cId="4069352828" sldId="310"/>
-            <ac:spMk id="2" creationId="{31EE8F9E-C635-4FF1-AAE5-6957CB8FB6D0}"/>
-          </ac:spMkLst>
-        </pc:spChg>
-        <pc:spChg chg="del">
-          <ac:chgData name="Md Kauser Ahmmed" userId="81e39d19-8d5c-4ffe-9a82-20799efac8e0" providerId="ADAL" clId="{4DBB0182-D948-422F-9F4E-BA3A2E2584B9}" dt="2021-01-29T17:20:02.142" v="961" actId="931"/>
-          <ac:spMkLst>
-            <pc:docMk/>
-            <pc:sldMk cId="4069352828" sldId="310"/>
-            <ac:spMk id="3" creationId="{CBE4A4E6-4A46-428C-AA18-5DCE21F39986}"/>
-          </ac:spMkLst>
-        </pc:spChg>
-        <pc:picChg chg="add mod">
-          <ac:chgData name="Md Kauser Ahmmed" userId="81e39d19-8d5c-4ffe-9a82-20799efac8e0" providerId="ADAL" clId="{4DBB0182-D948-422F-9F4E-BA3A2E2584B9}" dt="2021-01-29T17:20:08.241" v="964" actId="962"/>
-          <ac:picMkLst>
-            <pc:docMk/>
-            <pc:sldMk cId="4069352828" sldId="310"/>
-            <ac:picMk id="5" creationId="{7ABDC6C9-4AB9-4271-90CE-38C7F267207B}"/>
-          </ac:picMkLst>
-        </pc:picChg>
-      </pc:sldChg>
-      <pc:sldChg chg="addSp delSp modSp new mod">
-        <pc:chgData name="Md Kauser Ahmmed" userId="81e39d19-8d5c-4ffe-9a82-20799efac8e0" providerId="ADAL" clId="{4DBB0182-D948-422F-9F4E-BA3A2E2584B9}" dt="2021-01-29T17:20:46.512" v="976" actId="962"/>
-        <pc:sldMkLst>
-          <pc:docMk/>
-          <pc:sldMk cId="706604625" sldId="311"/>
-        </pc:sldMkLst>
-        <pc:spChg chg="mod">
-          <ac:chgData name="Md Kauser Ahmmed" userId="81e39d19-8d5c-4ffe-9a82-20799efac8e0" providerId="ADAL" clId="{4DBB0182-D948-422F-9F4E-BA3A2E2584B9}" dt="2021-01-29T17:20:35.433" v="973" actId="255"/>
-          <ac:spMkLst>
-            <pc:docMk/>
-            <pc:sldMk cId="706604625" sldId="311"/>
-            <ac:spMk id="2" creationId="{01237D72-F1B3-4455-859C-F93227383A1E}"/>
-          </ac:spMkLst>
-        </pc:spChg>
-        <pc:spChg chg="del">
-          <ac:chgData name="Md Kauser Ahmmed" userId="81e39d19-8d5c-4ffe-9a82-20799efac8e0" providerId="ADAL" clId="{4DBB0182-D948-422F-9F4E-BA3A2E2584B9}" dt="2021-01-29T17:20:44.112" v="974" actId="931"/>
-          <ac:spMkLst>
-            <pc:docMk/>
-            <pc:sldMk cId="706604625" sldId="311"/>
-            <ac:spMk id="3" creationId="{094CE0A3-0D33-49D6-AE1F-4BABC9172B3B}"/>
-          </ac:spMkLst>
-        </pc:spChg>
-        <pc:picChg chg="add mod">
-          <ac:chgData name="Md Kauser Ahmmed" userId="81e39d19-8d5c-4ffe-9a82-20799efac8e0" providerId="ADAL" clId="{4DBB0182-D948-422F-9F4E-BA3A2E2584B9}" dt="2021-01-29T17:20:46.512" v="976" actId="962"/>
-          <ac:picMkLst>
-            <pc:docMk/>
-            <pc:sldMk cId="706604625" sldId="311"/>
-            <ac:picMk id="5" creationId="{8F286E4F-3086-4745-BA8B-7F94AA54C4D0}"/>
-          </ac:picMkLst>
-        </pc:picChg>
-      </pc:sldChg>
-      <pc:sldChg chg="addSp delSp modSp new mod">
-        <pc:chgData name="Md Kauser Ahmmed" userId="81e39d19-8d5c-4ffe-9a82-20799efac8e0" providerId="ADAL" clId="{4DBB0182-D948-422F-9F4E-BA3A2E2584B9}" dt="2021-01-29T18:00:41.080" v="1046" actId="14100"/>
-        <pc:sldMkLst>
-          <pc:docMk/>
-          <pc:sldMk cId="3739373481" sldId="312"/>
-        </pc:sldMkLst>
-        <pc:spChg chg="mod">
-          <ac:chgData name="Md Kauser Ahmmed" userId="81e39d19-8d5c-4ffe-9a82-20799efac8e0" providerId="ADAL" clId="{4DBB0182-D948-422F-9F4E-BA3A2E2584B9}" dt="2021-01-29T17:59:33.192" v="1032" actId="20577"/>
-          <ac:spMkLst>
-            <pc:docMk/>
-            <pc:sldMk cId="3739373481" sldId="312"/>
-            <ac:spMk id="2" creationId="{F4E91E8C-AA70-40B4-B70F-A352E4F9D2DD}"/>
-          </ac:spMkLst>
-        </pc:spChg>
-        <pc:spChg chg="add del mod">
-          <ac:chgData name="Md Kauser Ahmmed" userId="81e39d19-8d5c-4ffe-9a82-20799efac8e0" providerId="ADAL" clId="{4DBB0182-D948-422F-9F4E-BA3A2E2584B9}" dt="2021-01-29T18:00:41.080" v="1046" actId="14100"/>
-          <ac:spMkLst>
-            <pc:docMk/>
-            <pc:sldMk cId="3739373481" sldId="312"/>
-            <ac:spMk id="3" creationId="{E2FDCB64-29A2-4230-A449-F77C8D203C20}"/>
-          </ac:spMkLst>
-        </pc:spChg>
-        <pc:spChg chg="add del mod">
-          <ac:chgData name="Md Kauser Ahmmed" userId="81e39d19-8d5c-4ffe-9a82-20799efac8e0" providerId="ADAL" clId="{4DBB0182-D948-422F-9F4E-BA3A2E2584B9}" dt="2021-01-29T17:59:41.759" v="1035"/>
-          <ac:spMkLst>
-            <pc:docMk/>
-            <pc:sldMk cId="3739373481" sldId="312"/>
-            <ac:spMk id="4" creationId="{4581D5A1-BE1F-440C-BF3E-A95FCF9064BE}"/>
-          </ac:spMkLst>
-        </pc:spChg>
-      </pc:sldChg>
-      <pc:sldChg chg="addSp delSp modSp new mod setBg">
-        <pc:chgData name="Md Kauser Ahmmed" userId="81e39d19-8d5c-4ffe-9a82-20799efac8e0" providerId="ADAL" clId="{4DBB0182-D948-422F-9F4E-BA3A2E2584B9}" dt="2021-01-29T19:02:25.358" v="1096" actId="14734"/>
-        <pc:sldMkLst>
-          <pc:docMk/>
-          <pc:sldMk cId="3844149522" sldId="313"/>
-        </pc:sldMkLst>
-        <pc:spChg chg="mod">
-          <ac:chgData name="Md Kauser Ahmmed" userId="81e39d19-8d5c-4ffe-9a82-20799efac8e0" providerId="ADAL" clId="{4DBB0182-D948-422F-9F4E-BA3A2E2584B9}" dt="2021-01-29T18:33:49.448" v="1094" actId="26606"/>
-          <ac:spMkLst>
-            <pc:docMk/>
-            <pc:sldMk cId="3844149522" sldId="313"/>
-            <ac:spMk id="2" creationId="{89463756-F4F3-4DCF-8E25-6AC5BA9DCA41}"/>
-          </ac:spMkLst>
-        </pc:spChg>
-        <pc:spChg chg="del">
-          <ac:chgData name="Md Kauser Ahmmed" userId="81e39d19-8d5c-4ffe-9a82-20799efac8e0" providerId="ADAL" clId="{4DBB0182-D948-422F-9F4E-BA3A2E2584B9}" dt="2021-01-29T18:32:39.175" v="1058"/>
-          <ac:spMkLst>
-            <pc:docMk/>
-            <pc:sldMk cId="3844149522" sldId="313"/>
-            <ac:spMk id="3" creationId="{2B8128AB-63CE-4AB4-B842-C70F6E57B330}"/>
-          </ac:spMkLst>
-        </pc:spChg>
-        <pc:spChg chg="add">
-          <ac:chgData name="Md Kauser Ahmmed" userId="81e39d19-8d5c-4ffe-9a82-20799efac8e0" providerId="ADAL" clId="{4DBB0182-D948-422F-9F4E-BA3A2E2584B9}" dt="2021-01-29T18:33:49.448" v="1094" actId="26606"/>
-          <ac:spMkLst>
-            <pc:docMk/>
-            <pc:sldMk cId="3844149522" sldId="313"/>
-            <ac:spMk id="9" creationId="{1045B59B-615E-4718-A150-42DE5D03E1C8}"/>
-          </ac:spMkLst>
-        </pc:spChg>
-        <pc:spChg chg="add">
-          <ac:chgData name="Md Kauser Ahmmed" userId="81e39d19-8d5c-4ffe-9a82-20799efac8e0" providerId="ADAL" clId="{4DBB0182-D948-422F-9F4E-BA3A2E2584B9}" dt="2021-01-29T18:33:49.448" v="1094" actId="26606"/>
-          <ac:spMkLst>
-            <pc:docMk/>
-            <pc:sldMk cId="3844149522" sldId="313"/>
-            <ac:spMk id="11" creationId="{D6CF29CD-38B8-4924-BA11-6D60517487EF}"/>
-          </ac:spMkLst>
-        </pc:spChg>
-        <pc:graphicFrameChg chg="add mod modGraphic">
-          <ac:chgData name="Md Kauser Ahmmed" userId="81e39d19-8d5c-4ffe-9a82-20799efac8e0" providerId="ADAL" clId="{4DBB0182-D948-422F-9F4E-BA3A2E2584B9}" dt="2021-01-29T19:02:25.358" v="1096" actId="14734"/>
-          <ac:graphicFrameMkLst>
-            <pc:docMk/>
-            <pc:sldMk cId="3844149522" sldId="313"/>
-            <ac:graphicFrameMk id="4" creationId="{A5968C8D-2CB5-407F-B06E-7BEAB3225CD9}"/>
-          </ac:graphicFrameMkLst>
-        </pc:graphicFrameChg>
-      </pc:sldChg>
-    </pc:docChg>
-  </pc:docChgLst>
-  <pc:docChgLst>
-    <pc:chgData name="Md Kauser Ahmmed" userId="81e39d19-8d5c-4ffe-9a82-20799efac8e0" providerId="ADAL" clId="{493F2EBC-02EC-4170-8502-33D60480A14B}"/>
-    <pc:docChg chg="undo custSel mod addSld delSld modSld sldOrd">
-      <pc:chgData name="Md Kauser Ahmmed" userId="81e39d19-8d5c-4ffe-9a82-20799efac8e0" providerId="ADAL" clId="{493F2EBC-02EC-4170-8502-33D60480A14B}" dt="2021-01-22T17:44:34.640" v="1995" actId="20577"/>
-      <pc:docMkLst>
-        <pc:docMk/>
-      </pc:docMkLst>
-      <pc:sldChg chg="modSp add">
-        <pc:chgData name="Md Kauser Ahmmed" userId="81e39d19-8d5c-4ffe-9a82-20799efac8e0" providerId="ADAL" clId="{493F2EBC-02EC-4170-8502-33D60480A14B}" dt="2021-01-15T15:57:41.678" v="43" actId="20577"/>
-        <pc:sldMkLst>
-          <pc:docMk/>
-          <pc:sldMk cId="2006097519" sldId="256"/>
-        </pc:sldMkLst>
-        <pc:spChg chg="mod">
-          <ac:chgData name="Md Kauser Ahmmed" userId="81e39d19-8d5c-4ffe-9a82-20799efac8e0" providerId="ADAL" clId="{493F2EBC-02EC-4170-8502-33D60480A14B}" dt="2021-01-15T15:57:32.674" v="18" actId="20577"/>
-          <ac:spMkLst>
-            <pc:docMk/>
-            <pc:sldMk cId="2006097519" sldId="256"/>
-            <ac:spMk id="2" creationId="{AEBDAA72-FF48-42CF-A6B6-C1C80010963F}"/>
-          </ac:spMkLst>
-        </pc:spChg>
-        <pc:spChg chg="mod">
-          <ac:chgData name="Md Kauser Ahmmed" userId="81e39d19-8d5c-4ffe-9a82-20799efac8e0" providerId="ADAL" clId="{493F2EBC-02EC-4170-8502-33D60480A14B}" dt="2021-01-15T15:57:41.678" v="43" actId="20577"/>
-          <ac:spMkLst>
-            <pc:docMk/>
-            <pc:sldMk cId="2006097519" sldId="256"/>
-            <ac:spMk id="3" creationId="{4A796019-1174-416E-99B9-9CF117EE3B6F}"/>
-          </ac:spMkLst>
-        </pc:spChg>
-      </pc:sldChg>
-      <pc:sldChg chg="add del">
-        <pc:chgData name="Md Kauser Ahmmed" userId="81e39d19-8d5c-4ffe-9a82-20799efac8e0" providerId="ADAL" clId="{493F2EBC-02EC-4170-8502-33D60480A14B}" dt="2021-01-15T15:58:38.857" v="46" actId="2696"/>
-        <pc:sldMkLst>
-          <pc:docMk/>
-          <pc:sldMk cId="2240536683" sldId="257"/>
-        </pc:sldMkLst>
-      </pc:sldChg>
-      <pc:sldChg chg="modSp add">
-        <pc:chgData name="Md Kauser Ahmmed" userId="81e39d19-8d5c-4ffe-9a82-20799efac8e0" providerId="ADAL" clId="{493F2EBC-02EC-4170-8502-33D60480A14B}" dt="2021-01-15T17:27:50.937" v="1193" actId="20577"/>
-        <pc:sldMkLst>
-          <pc:docMk/>
-          <pc:sldMk cId="1493241202" sldId="289"/>
-        </pc:sldMkLst>
-        <pc:spChg chg="mod">
-          <ac:chgData name="Md Kauser Ahmmed" userId="81e39d19-8d5c-4ffe-9a82-20799efac8e0" providerId="ADAL" clId="{493F2EBC-02EC-4170-8502-33D60480A14B}" dt="2021-01-15T17:27:50.937" v="1193" actId="20577"/>
-          <ac:spMkLst>
-            <pc:docMk/>
-            <pc:sldMk cId="1493241202" sldId="289"/>
-            <ac:spMk id="2" creationId="{2A32364B-E594-4014-AB37-6A6F82375CD6}"/>
-          </ac:spMkLst>
-        </pc:spChg>
-        <pc:spChg chg="mod">
-          <ac:chgData name="Md Kauser Ahmmed" userId="81e39d19-8d5c-4ffe-9a82-20799efac8e0" providerId="ADAL" clId="{493F2EBC-02EC-4170-8502-33D60480A14B}" dt="2021-01-15T16:50:50.708" v="1077" actId="20577"/>
-          <ac:spMkLst>
-            <pc:docMk/>
-            <pc:sldMk cId="1493241202" sldId="289"/>
-            <ac:spMk id="3" creationId="{FAF7EFD8-937E-4485-A5BE-D7EBC0477783}"/>
-          </ac:spMkLst>
-        </pc:spChg>
-      </pc:sldChg>
-      <pc:sldChg chg="addSp delSp modSp add modNotesTx">
-        <pc:chgData name="Md Kauser Ahmmed" userId="81e39d19-8d5c-4ffe-9a82-20799efac8e0" providerId="ADAL" clId="{493F2EBC-02EC-4170-8502-33D60480A14B}" dt="2021-01-15T18:03:53.309" v="1606" actId="20577"/>
-        <pc:sldMkLst>
-          <pc:docMk/>
-          <pc:sldMk cId="3625187802" sldId="290"/>
-        </pc:sldMkLst>
-        <pc:spChg chg="mod">
-          <ac:chgData name="Md Kauser Ahmmed" userId="81e39d19-8d5c-4ffe-9a82-20799efac8e0" providerId="ADAL" clId="{493F2EBC-02EC-4170-8502-33D60480A14B}" dt="2021-01-15T18:03:53.309" v="1606" actId="20577"/>
-          <ac:spMkLst>
-            <pc:docMk/>
-            <pc:sldMk cId="3625187802" sldId="290"/>
-            <ac:spMk id="3" creationId="{64F80B61-502D-47EC-86FD-28DA3D65A610}"/>
-          </ac:spMkLst>
-        </pc:spChg>
-        <pc:spChg chg="mod">
-          <ac:chgData name="Md Kauser Ahmmed" userId="81e39d19-8d5c-4ffe-9a82-20799efac8e0" providerId="ADAL" clId="{493F2EBC-02EC-4170-8502-33D60480A14B}" dt="2021-01-15T16:15:03.228" v="491" actId="20577"/>
-          <ac:spMkLst>
-            <pc:docMk/>
-            <pc:sldMk cId="3625187802" sldId="290"/>
-            <ac:spMk id="4" creationId="{6AEC439A-3C5B-4863-9155-034116FD58FC}"/>
-          </ac:spMkLst>
-        </pc:spChg>
-        <pc:spChg chg="add del">
-          <ac:chgData name="Md Kauser Ahmmed" userId="81e39d19-8d5c-4ffe-9a82-20799efac8e0" providerId="ADAL" clId="{493F2EBC-02EC-4170-8502-33D60480A14B}" dt="2021-01-15T16:15:14.755" v="494"/>
-          <ac:spMkLst>
-            <pc:docMk/>
-            <pc:sldMk cId="3625187802" sldId="290"/>
-            <ac:spMk id="5" creationId="{BCA39098-39BA-4641-B602-64D0522B7EEF}"/>
-          </ac:spMkLst>
-        </pc:spChg>
-      </pc:sldChg>
-      <pc:sldChg chg="add del">
-        <pc:chgData name="Md Kauser Ahmmed" userId="81e39d19-8d5c-4ffe-9a82-20799efac8e0" providerId="ADAL" clId="{493F2EBC-02EC-4170-8502-33D60480A14B}" dt="2021-01-15T16:15:11.393" v="492" actId="2696"/>
-        <pc:sldMkLst>
-          <pc:docMk/>
-          <pc:sldMk cId="3212494215" sldId="291"/>
-        </pc:sldMkLst>
-      </pc:sldChg>
-      <pc:sldChg chg="addSp delSp modSp add">
-        <pc:chgData name="Md Kauser Ahmmed" userId="81e39d19-8d5c-4ffe-9a82-20799efac8e0" providerId="ADAL" clId="{493F2EBC-02EC-4170-8502-33D60480A14B}" dt="2021-01-15T18:03:50.957" v="1605" actId="20577"/>
-        <pc:sldMkLst>
-          <pc:docMk/>
-          <pc:sldMk cId="4160295388" sldId="291"/>
-        </pc:sldMkLst>
-        <pc:spChg chg="del mod">
-          <ac:chgData name="Md Kauser Ahmmed" userId="81e39d19-8d5c-4ffe-9a82-20799efac8e0" providerId="ADAL" clId="{493F2EBC-02EC-4170-8502-33D60480A14B}" dt="2021-01-15T16:48:50.534" v="1040" actId="478"/>
-          <ac:spMkLst>
-            <pc:docMk/>
-            <pc:sldMk cId="4160295388" sldId="291"/>
-            <ac:spMk id="3" creationId="{64F80B61-502D-47EC-86FD-28DA3D65A610}"/>
-          </ac:spMkLst>
-        </pc:spChg>
-        <pc:spChg chg="mod">
-          <ac:chgData name="Md Kauser Ahmmed" userId="81e39d19-8d5c-4ffe-9a82-20799efac8e0" providerId="ADAL" clId="{493F2EBC-02EC-4170-8502-33D60480A14B}" dt="2021-01-15T16:15:27.042" v="503" actId="20577"/>
-          <ac:spMkLst>
-            <pc:docMk/>
-            <pc:sldMk cId="4160295388" sldId="291"/>
-            <ac:spMk id="4" creationId="{6AEC439A-3C5B-4863-9155-034116FD58FC}"/>
-          </ac:spMkLst>
-        </pc:spChg>
-        <pc:spChg chg="add del mod">
-          <ac:chgData name="Md Kauser Ahmmed" userId="81e39d19-8d5c-4ffe-9a82-20799efac8e0" providerId="ADAL" clId="{493F2EBC-02EC-4170-8502-33D60480A14B}" dt="2021-01-15T16:48:53.673" v="1041" actId="478"/>
-          <ac:spMkLst>
-            <pc:docMk/>
-            <pc:sldMk cId="4160295388" sldId="291"/>
-            <ac:spMk id="5" creationId="{372D9376-7D96-436B-9E41-57950CE9D72D}"/>
-          </ac:spMkLst>
-        </pc:spChg>
-        <pc:spChg chg="add mod">
-          <ac:chgData name="Md Kauser Ahmmed" userId="81e39d19-8d5c-4ffe-9a82-20799efac8e0" providerId="ADAL" clId="{493F2EBC-02EC-4170-8502-33D60480A14B}" dt="2021-01-15T18:03:50.957" v="1605" actId="20577"/>
-          <ac:spMkLst>
-            <pc:docMk/>
-            <pc:sldMk cId="4160295388" sldId="291"/>
-            <ac:spMk id="6" creationId="{B9F24D49-A6BF-42DD-AB82-41C553DBB037}"/>
-          </ac:spMkLst>
-        </pc:spChg>
-      </pc:sldChg>
-      <pc:sldChg chg="modSp add ord">
-        <pc:chgData name="Md Kauser Ahmmed" userId="81e39d19-8d5c-4ffe-9a82-20799efac8e0" providerId="ADAL" clId="{493F2EBC-02EC-4170-8502-33D60480A14B}" dt="2021-01-15T17:40:33.307" v="1194"/>
-        <pc:sldMkLst>
-          <pc:docMk/>
-          <pc:sldMk cId="1686372199" sldId="292"/>
-        </pc:sldMkLst>
-        <pc:spChg chg="mod">
-          <ac:chgData name="Md Kauser Ahmmed" userId="81e39d19-8d5c-4ffe-9a82-20799efac8e0" providerId="ADAL" clId="{493F2EBC-02EC-4170-8502-33D60480A14B}" dt="2021-01-15T17:08:38.606" v="1162" actId="20577"/>
-          <ac:spMkLst>
-            <pc:docMk/>
-            <pc:sldMk cId="1686372199" sldId="292"/>
-            <ac:spMk id="2" creationId="{F569C05B-F406-4613-8012-1E0E756BA18C}"/>
-          </ac:spMkLst>
-        </pc:spChg>
-        <pc:spChg chg="mod">
-          <ac:chgData name="Md Kauser Ahmmed" userId="81e39d19-8d5c-4ffe-9a82-20799efac8e0" providerId="ADAL" clId="{493F2EBC-02EC-4170-8502-33D60480A14B}" dt="2021-01-15T16:38:33.002" v="828" actId="20577"/>
-          <ac:spMkLst>
-            <pc:docMk/>
-            <pc:sldMk cId="1686372199" sldId="292"/>
-            <ac:spMk id="3" creationId="{1ADF2921-7174-49C4-8F93-68E27B432AE2}"/>
-          </ac:spMkLst>
-        </pc:spChg>
-      </pc:sldChg>
-      <pc:sldChg chg="addSp delSp modSp add ord">
-        <pc:chgData name="Md Kauser Ahmmed" userId="81e39d19-8d5c-4ffe-9a82-20799efac8e0" providerId="ADAL" clId="{493F2EBC-02EC-4170-8502-33D60480A14B}" dt="2021-01-15T17:40:33.307" v="1194"/>
-        <pc:sldMkLst>
-          <pc:docMk/>
-          <pc:sldMk cId="675136312" sldId="293"/>
-        </pc:sldMkLst>
-        <pc:spChg chg="mod">
-          <ac:chgData name="Md Kauser Ahmmed" userId="81e39d19-8d5c-4ffe-9a82-20799efac8e0" providerId="ADAL" clId="{493F2EBC-02EC-4170-8502-33D60480A14B}" dt="2021-01-15T16:39:20.775" v="878" actId="20577"/>
-          <ac:spMkLst>
-            <pc:docMk/>
-            <pc:sldMk cId="675136312" sldId="293"/>
-            <ac:spMk id="2" creationId="{738B26C2-4373-446B-8029-46FFEC6F3E56}"/>
-          </ac:spMkLst>
-        </pc:spChg>
-        <pc:spChg chg="del">
-          <ac:chgData name="Md Kauser Ahmmed" userId="81e39d19-8d5c-4ffe-9a82-20799efac8e0" providerId="ADAL" clId="{493F2EBC-02EC-4170-8502-33D60480A14B}" dt="2021-01-15T16:40:29.565" v="879" actId="478"/>
-          <ac:spMkLst>
-            <pc:docMk/>
-            <pc:sldMk cId="675136312" sldId="293"/>
-            <ac:spMk id="3" creationId="{406E90FC-D54E-4FF3-AE42-805EC0AE34DF}"/>
-          </ac:spMkLst>
-        </pc:spChg>
-        <pc:spChg chg="add mod">
-          <ac:chgData name="Md Kauser Ahmmed" userId="81e39d19-8d5c-4ffe-9a82-20799efac8e0" providerId="ADAL" clId="{493F2EBC-02EC-4170-8502-33D60480A14B}" dt="2021-01-15T16:44:51.304" v="968" actId="20577"/>
-          <ac:spMkLst>
-            <pc:docMk/>
-            <pc:sldMk cId="675136312" sldId="293"/>
-            <ac:spMk id="4" creationId="{36126143-832A-4E8D-B6DE-213C571768D7}"/>
-          </ac:spMkLst>
-        </pc:spChg>
-      </pc:sldChg>
-      <pc:sldChg chg="addSp delSp modSp add mod setBg modNotesTx">
-        <pc:chgData name="Md Kauser Ahmmed" userId="81e39d19-8d5c-4ffe-9a82-20799efac8e0" providerId="ADAL" clId="{493F2EBC-02EC-4170-8502-33D60480A14B}" dt="2021-01-15T18:19:08.461" v="1818" actId="20577"/>
-        <pc:sldMkLst>
-          <pc:docMk/>
-          <pc:sldMk cId="2706077540" sldId="294"/>
-        </pc:sldMkLst>
-        <pc:spChg chg="mod">
-          <ac:chgData name="Md Kauser Ahmmed" userId="81e39d19-8d5c-4ffe-9a82-20799efac8e0" providerId="ADAL" clId="{493F2EBC-02EC-4170-8502-33D60480A14B}" dt="2021-01-15T17:27:26.883" v="1187" actId="26606"/>
-          <ac:spMkLst>
-            <pc:docMk/>
-            <pc:sldMk cId="2706077540" sldId="294"/>
-            <ac:spMk id="2" creationId="{67336AB1-F8D3-4CB3-A161-02F750F9D74B}"/>
-          </ac:spMkLst>
-        </pc:spChg>
-        <pc:spChg chg="del">
-          <ac:chgData name="Md Kauser Ahmmed" userId="81e39d19-8d5c-4ffe-9a82-20799efac8e0" providerId="ADAL" clId="{493F2EBC-02EC-4170-8502-33D60480A14B}" dt="2021-01-15T17:27:00.574" v="1179" actId="478"/>
-          <ac:spMkLst>
-            <pc:docMk/>
-            <pc:sldMk cId="2706077540" sldId="294"/>
-            <ac:spMk id="3" creationId="{1E8A3D68-0327-4534-960A-88BFA00FA542}"/>
-          </ac:spMkLst>
-        </pc:spChg>
-        <pc:spChg chg="add">
-          <ac:chgData name="Md Kauser Ahmmed" userId="81e39d19-8d5c-4ffe-9a82-20799efac8e0" providerId="ADAL" clId="{493F2EBC-02EC-4170-8502-33D60480A14B}" dt="2021-01-15T17:27:26.883" v="1187" actId="26606"/>
-          <ac:spMkLst>
-            <pc:docMk/>
-            <pc:sldMk cId="2706077540" sldId="294"/>
-            <ac:spMk id="10" creationId="{53F29798-D584-4792-9B62-3F5F5C36D619}"/>
-          </ac:spMkLst>
-        </pc:spChg>
-        <pc:picChg chg="add mod">
-          <ac:chgData name="Md Kauser Ahmmed" userId="81e39d19-8d5c-4ffe-9a82-20799efac8e0" providerId="ADAL" clId="{493F2EBC-02EC-4170-8502-33D60480A14B}" dt="2021-01-15T17:27:26.883" v="1187" actId="26606"/>
-          <ac:picMkLst>
-            <pc:docMk/>
-            <pc:sldMk cId="2706077540" sldId="294"/>
-            <ac:picMk id="5" creationId="{4B0A2808-FBDE-4B81-ABD0-DF969D466F48}"/>
-          </ac:picMkLst>
-        </pc:picChg>
-      </pc:sldChg>
-      <pc:sldChg chg="modSp add">
-        <pc:chgData name="Md Kauser Ahmmed" userId="81e39d19-8d5c-4ffe-9a82-20799efac8e0" providerId="ADAL" clId="{493F2EBC-02EC-4170-8502-33D60480A14B}" dt="2021-01-15T17:50:54.303" v="1356" actId="20577"/>
-        <pc:sldMkLst>
-          <pc:docMk/>
-          <pc:sldMk cId="4181624959" sldId="295"/>
-        </pc:sldMkLst>
-        <pc:spChg chg="mod">
-          <ac:chgData name="Md Kauser Ahmmed" userId="81e39d19-8d5c-4ffe-9a82-20799efac8e0" providerId="ADAL" clId="{493F2EBC-02EC-4170-8502-33D60480A14B}" dt="2021-01-15T17:50:54.303" v="1356" actId="20577"/>
-          <ac:spMkLst>
-            <pc:docMk/>
-            <pc:sldMk cId="4181624959" sldId="295"/>
-            <ac:spMk id="3" creationId="{1ADF2921-7174-49C4-8F93-68E27B432AE2}"/>
-          </ac:spMkLst>
-        </pc:spChg>
-      </pc:sldChg>
-      <pc:sldChg chg="modSp add">
-        <pc:chgData name="Md Kauser Ahmmed" userId="81e39d19-8d5c-4ffe-9a82-20799efac8e0" providerId="ADAL" clId="{493F2EBC-02EC-4170-8502-33D60480A14B}" dt="2021-01-15T17:55:19.197" v="1454" actId="20577"/>
-        <pc:sldMkLst>
-          <pc:docMk/>
-          <pc:sldMk cId="2092622795" sldId="296"/>
-        </pc:sldMkLst>
-        <pc:spChg chg="mod">
-          <ac:chgData name="Md Kauser Ahmmed" userId="81e39d19-8d5c-4ffe-9a82-20799efac8e0" providerId="ADAL" clId="{493F2EBC-02EC-4170-8502-33D60480A14B}" dt="2021-01-15T17:55:19.197" v="1454" actId="20577"/>
-          <ac:spMkLst>
-            <pc:docMk/>
-            <pc:sldMk cId="2092622795" sldId="296"/>
-            <ac:spMk id="4" creationId="{36126143-832A-4E8D-B6DE-213C571768D7}"/>
-          </ac:spMkLst>
-        </pc:spChg>
-      </pc:sldChg>
-      <pc:sldChg chg="delSp modSp add">
-        <pc:chgData name="Md Kauser Ahmmed" userId="81e39d19-8d5c-4ffe-9a82-20799efac8e0" providerId="ADAL" clId="{493F2EBC-02EC-4170-8502-33D60480A14B}" dt="2021-01-15T17:48:19.475" v="1258" actId="122"/>
-        <pc:sldMkLst>
-          <pc:docMk/>
-          <pc:sldMk cId="418254397" sldId="297"/>
-        </pc:sldMkLst>
-        <pc:spChg chg="mod">
-          <ac:chgData name="Md Kauser Ahmmed" userId="81e39d19-8d5c-4ffe-9a82-20799efac8e0" providerId="ADAL" clId="{493F2EBC-02EC-4170-8502-33D60480A14B}" dt="2021-01-15T17:48:19.475" v="1258" actId="122"/>
-          <ac:spMkLst>
-            <pc:docMk/>
-            <pc:sldMk cId="418254397" sldId="297"/>
-            <ac:spMk id="2" creationId="{8378AEE8-C173-45AB-910C-AA017D072967}"/>
-          </ac:spMkLst>
-        </pc:spChg>
-        <pc:spChg chg="del">
-          <ac:chgData name="Md Kauser Ahmmed" userId="81e39d19-8d5c-4ffe-9a82-20799efac8e0" providerId="ADAL" clId="{493F2EBC-02EC-4170-8502-33D60480A14B}" dt="2021-01-15T17:48:11.693" v="1217" actId="478"/>
-          <ac:spMkLst>
-            <pc:docMk/>
-            <pc:sldMk cId="418254397" sldId="297"/>
-            <ac:spMk id="3" creationId="{C2D02DB4-CA8C-452B-816A-F7193C4C4112}"/>
-          </ac:spMkLst>
-        </pc:spChg>
-      </pc:sldChg>
-      <pc:sldChg chg="modSp add">
-        <pc:chgData name="Md Kauser Ahmmed" userId="81e39d19-8d5c-4ffe-9a82-20799efac8e0" providerId="ADAL" clId="{493F2EBC-02EC-4170-8502-33D60480A14B}" dt="2021-01-15T17:57:25.400" v="1489" actId="20577"/>
-        <pc:sldMkLst>
-          <pc:docMk/>
-          <pc:sldMk cId="2483931024" sldId="298"/>
-        </pc:sldMkLst>
-        <pc:spChg chg="mod">
-          <ac:chgData name="Md Kauser Ahmmed" userId="81e39d19-8d5c-4ffe-9a82-20799efac8e0" providerId="ADAL" clId="{493F2EBC-02EC-4170-8502-33D60480A14B}" dt="2021-01-15T17:57:25.400" v="1489" actId="20577"/>
-          <ac:spMkLst>
-            <pc:docMk/>
-            <pc:sldMk cId="2483931024" sldId="298"/>
-            <ac:spMk id="2" creationId="{2A32364B-E594-4014-AB37-6A6F82375CD6}"/>
-          </ac:spMkLst>
-        </pc:spChg>
-        <pc:spChg chg="mod">
-          <ac:chgData name="Md Kauser Ahmmed" userId="81e39d19-8d5c-4ffe-9a82-20799efac8e0" providerId="ADAL" clId="{493F2EBC-02EC-4170-8502-33D60480A14B}" dt="2021-01-15T17:57:14.701" v="1479" actId="20577"/>
-          <ac:spMkLst>
-            <pc:docMk/>
-            <pc:sldMk cId="2483931024" sldId="298"/>
-            <ac:spMk id="3" creationId="{FAF7EFD8-937E-4485-A5BE-D7EBC0477783}"/>
-          </ac:spMkLst>
-        </pc:spChg>
-      </pc:sldChg>
-      <pc:sldChg chg="modSp add">
-        <pc:chgData name="Md Kauser Ahmmed" userId="81e39d19-8d5c-4ffe-9a82-20799efac8e0" providerId="ADAL" clId="{493F2EBC-02EC-4170-8502-33D60480A14B}" dt="2021-01-15T18:04:41.506" v="1623" actId="20577"/>
-        <pc:sldMkLst>
-          <pc:docMk/>
-          <pc:sldMk cId="124394224" sldId="299"/>
-        </pc:sldMkLst>
-        <pc:spChg chg="mod">
-          <ac:chgData name="Md Kauser Ahmmed" userId="81e39d19-8d5c-4ffe-9a82-20799efac8e0" providerId="ADAL" clId="{493F2EBC-02EC-4170-8502-33D60480A14B}" dt="2021-01-15T18:04:41.506" v="1623" actId="20577"/>
-          <ac:spMkLst>
-            <pc:docMk/>
-            <pc:sldMk cId="124394224" sldId="299"/>
-            <ac:spMk id="3" creationId="{64F80B61-502D-47EC-86FD-28DA3D65A610}"/>
-          </ac:spMkLst>
-        </pc:spChg>
-      </pc:sldChg>
-      <pc:sldChg chg="modSp add">
-        <pc:chgData name="Md Kauser Ahmmed" userId="81e39d19-8d5c-4ffe-9a82-20799efac8e0" providerId="ADAL" clId="{493F2EBC-02EC-4170-8502-33D60480A14B}" dt="2021-01-15T18:06:10.474" v="1642" actId="20577"/>
-        <pc:sldMkLst>
-          <pc:docMk/>
-          <pc:sldMk cId="72126194" sldId="300"/>
-        </pc:sldMkLst>
-        <pc:spChg chg="mod">
-          <ac:chgData name="Md Kauser Ahmmed" userId="81e39d19-8d5c-4ffe-9a82-20799efac8e0" providerId="ADAL" clId="{493F2EBC-02EC-4170-8502-33D60480A14B}" dt="2021-01-15T18:06:10.474" v="1642" actId="20577"/>
-          <ac:spMkLst>
-            <pc:docMk/>
-            <pc:sldMk cId="72126194" sldId="300"/>
-            <ac:spMk id="3" creationId="{64F80B61-502D-47EC-86FD-28DA3D65A610}"/>
-          </ac:spMkLst>
-        </pc:spChg>
-      </pc:sldChg>
-      <pc:sldChg chg="add del">
-        <pc:chgData name="Md Kauser Ahmmed" userId="81e39d19-8d5c-4ffe-9a82-20799efac8e0" providerId="ADAL" clId="{493F2EBC-02EC-4170-8502-33D60480A14B}" dt="2021-01-15T18:05:15.614" v="1624" actId="2696"/>
-        <pc:sldMkLst>
-          <pc:docMk/>
-          <pc:sldMk cId="1402649591" sldId="300"/>
-        </pc:sldMkLst>
-      </pc:sldChg>
-      <pc:sldChg chg="addSp delSp modSp add mod setBg delDesignElem modNotesTx">
-        <pc:chgData name="Md Kauser Ahmmed" userId="81e39d19-8d5c-4ffe-9a82-20799efac8e0" providerId="ADAL" clId="{493F2EBC-02EC-4170-8502-33D60480A14B}" dt="2021-01-15T18:18:21.451" v="1741" actId="20577"/>
-        <pc:sldMkLst>
-          <pc:docMk/>
-          <pc:sldMk cId="266561394" sldId="301"/>
-        </pc:sldMkLst>
-        <pc:spChg chg="mod">
-          <ac:chgData name="Md Kauser Ahmmed" userId="81e39d19-8d5c-4ffe-9a82-20799efac8e0" providerId="ADAL" clId="{493F2EBC-02EC-4170-8502-33D60480A14B}" dt="2021-01-15T18:17:24.904" v="1661" actId="20577"/>
-          <ac:spMkLst>
-            <pc:docMk/>
-            <pc:sldMk cId="266561394" sldId="301"/>
-            <ac:spMk id="2" creationId="{67336AB1-F8D3-4CB3-A161-02F750F9D74B}"/>
-          </ac:spMkLst>
-        </pc:spChg>
-        <pc:spChg chg="add">
-          <ac:chgData name="Md Kauser Ahmmed" userId="81e39d19-8d5c-4ffe-9a82-20799efac8e0" providerId="ADAL" clId="{493F2EBC-02EC-4170-8502-33D60480A14B}" dt="2021-01-15T18:17:18.786" v="1651" actId="26606"/>
-          <ac:spMkLst>
-            <pc:docMk/>
-            <pc:sldMk cId="266561394" sldId="301"/>
-            <ac:spMk id="9" creationId="{53F29798-D584-4792-9B62-3F5F5C36D619}"/>
-          </ac:spMkLst>
-        </pc:spChg>
-        <pc:spChg chg="del">
-          <ac:chgData name="Md Kauser Ahmmed" userId="81e39d19-8d5c-4ffe-9a82-20799efac8e0" providerId="ADAL" clId="{493F2EBC-02EC-4170-8502-33D60480A14B}" dt="2021-01-15T18:17:05.662" v="1646"/>
-          <ac:spMkLst>
-            <pc:docMk/>
-            <pc:sldMk cId="266561394" sldId="301"/>
-            <ac:spMk id="10" creationId="{53F29798-D584-4792-9B62-3F5F5C36D619}"/>
-          </ac:spMkLst>
-        </pc:spChg>
-        <pc:picChg chg="add mod">
-          <ac:chgData name="Md Kauser Ahmmed" userId="81e39d19-8d5c-4ffe-9a82-20799efac8e0" providerId="ADAL" clId="{493F2EBC-02EC-4170-8502-33D60480A14B}" dt="2021-01-15T18:17:18.786" v="1651" actId="26606"/>
-          <ac:picMkLst>
-            <pc:docMk/>
-            <pc:sldMk cId="266561394" sldId="301"/>
-            <ac:picMk id="4" creationId="{B63F8C53-D1B5-4C8F-9B99-8D3DF3E0464F}"/>
-          </ac:picMkLst>
-        </pc:picChg>
-        <pc:picChg chg="del">
-          <ac:chgData name="Md Kauser Ahmmed" userId="81e39d19-8d5c-4ffe-9a82-20799efac8e0" providerId="ADAL" clId="{493F2EBC-02EC-4170-8502-33D60480A14B}" dt="2021-01-15T18:17:09.326" v="1647" actId="478"/>
-          <ac:picMkLst>
-            <pc:docMk/>
-            <pc:sldMk cId="266561394" sldId="301"/>
-            <ac:picMk id="5" creationId="{4B0A2808-FBDE-4B81-ABD0-DF969D466F48}"/>
-          </ac:picMkLst>
-        </pc:picChg>
-      </pc:sldChg>
-      <pc:sldChg chg="add del">
-        <pc:chgData name="Md Kauser Ahmmed" userId="81e39d19-8d5c-4ffe-9a82-20799efac8e0" providerId="ADAL" clId="{493F2EBC-02EC-4170-8502-33D60480A14B}" dt="2021-01-15T18:17:03.096" v="1644" actId="2696"/>
-        <pc:sldMkLst>
-          <pc:docMk/>
-          <pc:sldMk cId="3922705545" sldId="301"/>
-        </pc:sldMkLst>
-      </pc:sldChg>
-      <pc:sldChg chg="modSp add mod">
-        <pc:chgData name="Md Kauser Ahmmed" userId="81e39d19-8d5c-4ffe-9a82-20799efac8e0" providerId="ADAL" clId="{493F2EBC-02EC-4170-8502-33D60480A14B}" dt="2021-01-22T17:40:59.021" v="1909" actId="20577"/>
-        <pc:sldMkLst>
-          <pc:docMk/>
-          <pc:sldMk cId="1685443532" sldId="302"/>
-        </pc:sldMkLst>
-        <pc:spChg chg="mod">
-          <ac:chgData name="Md Kauser Ahmmed" userId="81e39d19-8d5c-4ffe-9a82-20799efac8e0" providerId="ADAL" clId="{493F2EBC-02EC-4170-8502-33D60480A14B}" dt="2021-01-22T17:36:51.683" v="1851" actId="20577"/>
-          <ac:spMkLst>
-            <pc:docMk/>
-            <pc:sldMk cId="1685443532" sldId="302"/>
-            <ac:spMk id="2" creationId="{738B26C2-4373-446B-8029-46FFEC6F3E56}"/>
-          </ac:spMkLst>
-        </pc:spChg>
-        <pc:spChg chg="mod">
-          <ac:chgData name="Md Kauser Ahmmed" userId="81e39d19-8d5c-4ffe-9a82-20799efac8e0" providerId="ADAL" clId="{493F2EBC-02EC-4170-8502-33D60480A14B}" dt="2021-01-22T17:40:59.021" v="1909" actId="20577"/>
-          <ac:spMkLst>
-            <pc:docMk/>
-            <pc:sldMk cId="1685443532" sldId="302"/>
-            <ac:spMk id="4" creationId="{36126143-832A-4E8D-B6DE-213C571768D7}"/>
-          </ac:spMkLst>
-        </pc:spChg>
-      </pc:sldChg>
-      <pc:sldChg chg="modSp add mod">
-        <pc:chgData name="Md Kauser Ahmmed" userId="81e39d19-8d5c-4ffe-9a82-20799efac8e0" providerId="ADAL" clId="{493F2EBC-02EC-4170-8502-33D60480A14B}" dt="2021-01-22T17:44:34.640" v="1995" actId="20577"/>
-        <pc:sldMkLst>
-          <pc:docMk/>
-          <pc:sldMk cId="1132210515" sldId="303"/>
-        </pc:sldMkLst>
-        <pc:spChg chg="mod">
-          <ac:chgData name="Md Kauser Ahmmed" userId="81e39d19-8d5c-4ffe-9a82-20799efac8e0" providerId="ADAL" clId="{493F2EBC-02EC-4170-8502-33D60480A14B}" dt="2021-01-22T17:41:21.777" v="1921" actId="20577"/>
-          <ac:spMkLst>
-            <pc:docMk/>
-            <pc:sldMk cId="1132210515" sldId="303"/>
-            <ac:spMk id="2" creationId="{738B26C2-4373-446B-8029-46FFEC6F3E56}"/>
-          </ac:spMkLst>
-        </pc:spChg>
-        <pc:spChg chg="mod">
-          <ac:chgData name="Md Kauser Ahmmed" userId="81e39d19-8d5c-4ffe-9a82-20799efac8e0" providerId="ADAL" clId="{493F2EBC-02EC-4170-8502-33D60480A14B}" dt="2021-01-22T17:44:34.640" v="1995" actId="20577"/>
-          <ac:spMkLst>
-            <pc:docMk/>
-            <pc:sldMk cId="1132210515" sldId="303"/>
-            <ac:spMk id="4" creationId="{36126143-832A-4E8D-B6DE-213C571768D7}"/>
-          </ac:spMkLst>
-        </pc:spChg>
-      </pc:sldChg>
-    </pc:docChg>
-  </pc:docChgLst>
 </pc:chgInfo>
 </file>
 
@@ -2309,7 +2309,7 @@
           <a:p>
             <a:fld id="{EDFE0192-C7DD-47F9-8DC1-FEA2C2C7BB47}" type="datetimeFigureOut">
               <a:rPr lang="en-US" smtClean="0"/>
-              <a:t>2/11/2021</a:t>
+              <a:t>4/25/2021</a:t>
             </a:fld>
             <a:endParaRPr lang="en-US"/>
           </a:p>
@@ -2978,7 +2978,7 @@
           <a:p>
             <a:fld id="{5AA1463F-1832-4573-B289-A34C0459EE0D}" type="datetimeFigureOut">
               <a:rPr lang="en-US" smtClean="0"/>
-              <a:t>2/11/2021</a:t>
+              <a:t>4/25/2021</a:t>
             </a:fld>
             <a:endParaRPr lang="en-US"/>
           </a:p>
@@ -3176,7 +3176,7 @@
           <a:p>
             <a:fld id="{5AA1463F-1832-4573-B289-A34C0459EE0D}" type="datetimeFigureOut">
               <a:rPr lang="en-US" smtClean="0"/>
-              <a:t>2/11/2021</a:t>
+              <a:t>4/25/2021</a:t>
             </a:fld>
             <a:endParaRPr lang="en-US"/>
           </a:p>
@@ -3384,7 +3384,7 @@
           <a:p>
             <a:fld id="{5AA1463F-1832-4573-B289-A34C0459EE0D}" type="datetimeFigureOut">
               <a:rPr lang="en-US" smtClean="0"/>
-              <a:t>2/11/2021</a:t>
+              <a:t>4/25/2021</a:t>
             </a:fld>
             <a:endParaRPr lang="en-US"/>
           </a:p>
@@ -3582,7 +3582,7 @@
           <a:p>
             <a:fld id="{5AA1463F-1832-4573-B289-A34C0459EE0D}" type="datetimeFigureOut">
               <a:rPr lang="en-US" smtClean="0"/>
-              <a:t>2/11/2021</a:t>
+              <a:t>4/25/2021</a:t>
             </a:fld>
             <a:endParaRPr lang="en-US"/>
           </a:p>
@@ -3857,7 +3857,7 @@
           <a:p>
             <a:fld id="{5AA1463F-1832-4573-B289-A34C0459EE0D}" type="datetimeFigureOut">
               <a:rPr lang="en-US" smtClean="0"/>
-              <a:t>2/11/2021</a:t>
+              <a:t>4/25/2021</a:t>
             </a:fld>
             <a:endParaRPr lang="en-US"/>
           </a:p>
@@ -4122,7 +4122,7 @@
           <a:p>
             <a:fld id="{5AA1463F-1832-4573-B289-A34C0459EE0D}" type="datetimeFigureOut">
               <a:rPr lang="en-US" smtClean="0"/>
-              <a:t>2/11/2021</a:t>
+              <a:t>4/25/2021</a:t>
             </a:fld>
             <a:endParaRPr lang="en-US"/>
           </a:p>
@@ -4534,7 +4534,7 @@
           <a:p>
             <a:fld id="{5AA1463F-1832-4573-B289-A34C0459EE0D}" type="datetimeFigureOut">
               <a:rPr lang="en-US" smtClean="0"/>
-              <a:t>2/11/2021</a:t>
+              <a:t>4/25/2021</a:t>
             </a:fld>
             <a:endParaRPr lang="en-US"/>
           </a:p>
@@ -4675,7 +4675,7 @@
           <a:p>
             <a:fld id="{5AA1463F-1832-4573-B289-A34C0459EE0D}" type="datetimeFigureOut">
               <a:rPr lang="en-US" smtClean="0"/>
-              <a:t>2/11/2021</a:t>
+              <a:t>4/25/2021</a:t>
             </a:fld>
             <a:endParaRPr lang="en-US"/>
           </a:p>
@@ -4788,7 +4788,7 @@
           <a:p>
             <a:fld id="{5AA1463F-1832-4573-B289-A34C0459EE0D}" type="datetimeFigureOut">
               <a:rPr lang="en-US" smtClean="0"/>
-              <a:t>2/11/2021</a:t>
+              <a:t>4/25/2021</a:t>
             </a:fld>
             <a:endParaRPr lang="en-US"/>
           </a:p>
@@ -5099,7 +5099,7 @@
           <a:p>
             <a:fld id="{5AA1463F-1832-4573-B289-A34C0459EE0D}" type="datetimeFigureOut">
               <a:rPr lang="en-US" smtClean="0"/>
-              <a:t>2/11/2021</a:t>
+              <a:t>4/25/2021</a:t>
             </a:fld>
             <a:endParaRPr lang="en-US"/>
           </a:p>
@@ -5387,7 +5387,7 @@
           <a:p>
             <a:fld id="{5AA1463F-1832-4573-B289-A34C0459EE0D}" type="datetimeFigureOut">
               <a:rPr lang="en-US" smtClean="0"/>
-              <a:t>2/11/2021</a:t>
+              <a:t>4/25/2021</a:t>
             </a:fld>
             <a:endParaRPr lang="en-US"/>
           </a:p>
@@ -5628,7 +5628,7 @@
           <a:p>
             <a:fld id="{5AA1463F-1832-4573-B289-A34C0459EE0D}" type="datetimeFigureOut">
               <a:rPr lang="en-US" smtClean="0"/>
-              <a:t>2/11/2021</a:t>
+              <a:t>4/25/2021</a:t>
             </a:fld>
             <a:endParaRPr lang="en-US"/>
           </a:p>
@@ -11009,7 +11009,7 @@
             <p:ph idx="1"/>
             <p:extLst>
               <p:ext uri="{D42A27DB-BD31-4B8C-83A1-F6EECF244321}">
-                <p14:modId xmlns:p14="http://schemas.microsoft.com/office/powerpoint/2010/main" val="1377471994"/>
+                <p14:modId xmlns:p14="http://schemas.microsoft.com/office/powerpoint/2010/main" val="1922377792"/>
               </p:ext>
             </p:extLst>
           </p:nvPr>
@@ -12696,17 +12696,14 @@
                         </a:spcAft>
                       </a:pPr>
                       <a:r>
-                        <a:rPr lang="en-US" sz="1900">
+                        <a:rPr lang="en-US" sz="1900" dirty="0">
                           <a:effectLst/>
+                          <a:latin typeface="Calibri" panose="020F0502020204030204" pitchFamily="34" charset="0"/>
+                          <a:ea typeface="Calibri" panose="020F0502020204030204" pitchFamily="34" charset="0"/>
+                          <a:cs typeface="Times New Roman" panose="02020603050405020304" pitchFamily="18" charset="0"/>
                         </a:rPr>
-                        <a:t>12585</a:t>
+                        <a:t>3187</a:t>
                       </a:r>
-                      <a:endParaRPr lang="en-US" sz="1900">
-                        <a:effectLst/>
-                        <a:latin typeface="Calibri" panose="020F0502020204030204" pitchFamily="34" charset="0"/>
-                        <a:ea typeface="Calibri" panose="020F0502020204030204" pitchFamily="34" charset="0"/>
-                        <a:cs typeface="Times New Roman" panose="02020603050405020304" pitchFamily="18" charset="0"/>
-                      </a:endParaRPr>
                     </a:p>
                   </a:txBody>
                   <a:tcPr marL="118611" marR="118611" marT="0" marB="0"/>
@@ -12730,15 +12727,12 @@
                       <a:r>
                         <a:rPr lang="en-US" sz="1900">
                           <a:effectLst/>
+                          <a:latin typeface="Calibri" panose="020F0502020204030204" pitchFamily="34" charset="0"/>
+                          <a:ea typeface="Calibri" panose="020F0502020204030204" pitchFamily="34" charset="0"/>
+                          <a:cs typeface="Times New Roman" panose="02020603050405020304" pitchFamily="18" charset="0"/>
                         </a:rPr>
-                        <a:t>12508</a:t>
+                        <a:t>2910</a:t>
                       </a:r>
-                      <a:endParaRPr lang="en-US" sz="1900">
-                        <a:effectLst/>
-                        <a:latin typeface="Calibri" panose="020F0502020204030204" pitchFamily="34" charset="0"/>
-                        <a:ea typeface="Calibri" panose="020F0502020204030204" pitchFamily="34" charset="0"/>
-                        <a:cs typeface="Times New Roman" panose="02020603050405020304" pitchFamily="18" charset="0"/>
-                      </a:endParaRPr>
                     </a:p>
                   </a:txBody>
                   <a:tcPr marL="118611" marR="118611" marT="0" marB="0"/>

</xml_diff>